<commit_message>
#25, update doc/design.pptx, images/design.png
</commit_message>
<xml_diff>
--- a/doc/design.pptx
+++ b/doc/design.pptx
@@ -259,7 +259,7 @@
           <a:p>
             <a:fld id="{6E54FC5B-417A-4AFB-9851-210C2EBD3C69}" type="datetimeFigureOut">
               <a:rPr kumimoji="1" lang="ja-JP" altLang="en-US" smtClean="0"/>
-              <a:t>2023/5/28</a:t>
+              <a:t>2023/9/12</a:t>
             </a:fld>
             <a:endParaRPr kumimoji="1" lang="ja-JP" altLang="en-US"/>
           </a:p>
@@ -489,7 +489,7 @@
           <a:p>
             <a:fld id="{6E54FC5B-417A-4AFB-9851-210C2EBD3C69}" type="datetimeFigureOut">
               <a:rPr kumimoji="1" lang="ja-JP" altLang="en-US" smtClean="0"/>
-              <a:t>2023/5/28</a:t>
+              <a:t>2023/9/12</a:t>
             </a:fld>
             <a:endParaRPr kumimoji="1" lang="ja-JP" altLang="en-US"/>
           </a:p>
@@ -729,7 +729,7 @@
           <a:p>
             <a:fld id="{6E54FC5B-417A-4AFB-9851-210C2EBD3C69}" type="datetimeFigureOut">
               <a:rPr kumimoji="1" lang="ja-JP" altLang="en-US" smtClean="0"/>
-              <a:t>2023/5/28</a:t>
+              <a:t>2023/9/12</a:t>
             </a:fld>
             <a:endParaRPr kumimoji="1" lang="ja-JP" altLang="en-US"/>
           </a:p>
@@ -959,7 +959,7 @@
           <a:p>
             <a:fld id="{6E54FC5B-417A-4AFB-9851-210C2EBD3C69}" type="datetimeFigureOut">
               <a:rPr kumimoji="1" lang="ja-JP" altLang="en-US" smtClean="0"/>
-              <a:t>2023/5/28</a:t>
+              <a:t>2023/9/12</a:t>
             </a:fld>
             <a:endParaRPr kumimoji="1" lang="ja-JP" altLang="en-US"/>
           </a:p>
@@ -1234,7 +1234,7 @@
           <a:p>
             <a:fld id="{6E54FC5B-417A-4AFB-9851-210C2EBD3C69}" type="datetimeFigureOut">
               <a:rPr kumimoji="1" lang="ja-JP" altLang="en-US" smtClean="0"/>
-              <a:t>2023/5/28</a:t>
+              <a:t>2023/9/12</a:t>
             </a:fld>
             <a:endParaRPr kumimoji="1" lang="ja-JP" altLang="en-US"/>
           </a:p>
@@ -1563,7 +1563,7 @@
           <a:p>
             <a:fld id="{6E54FC5B-417A-4AFB-9851-210C2EBD3C69}" type="datetimeFigureOut">
               <a:rPr kumimoji="1" lang="ja-JP" altLang="en-US" smtClean="0"/>
-              <a:t>2023/5/28</a:t>
+              <a:t>2023/9/12</a:t>
             </a:fld>
             <a:endParaRPr kumimoji="1" lang="ja-JP" altLang="en-US"/>
           </a:p>
@@ -2039,7 +2039,7 @@
           <a:p>
             <a:fld id="{6E54FC5B-417A-4AFB-9851-210C2EBD3C69}" type="datetimeFigureOut">
               <a:rPr kumimoji="1" lang="ja-JP" altLang="en-US" smtClean="0"/>
-              <a:t>2023/5/28</a:t>
+              <a:t>2023/9/12</a:t>
             </a:fld>
             <a:endParaRPr kumimoji="1" lang="ja-JP" altLang="en-US"/>
           </a:p>
@@ -2180,7 +2180,7 @@
           <a:p>
             <a:fld id="{6E54FC5B-417A-4AFB-9851-210C2EBD3C69}" type="datetimeFigureOut">
               <a:rPr kumimoji="1" lang="ja-JP" altLang="en-US" smtClean="0"/>
-              <a:t>2023/5/28</a:t>
+              <a:t>2023/9/12</a:t>
             </a:fld>
             <a:endParaRPr kumimoji="1" lang="ja-JP" altLang="en-US"/>
           </a:p>
@@ -2293,7 +2293,7 @@
           <a:p>
             <a:fld id="{6E54FC5B-417A-4AFB-9851-210C2EBD3C69}" type="datetimeFigureOut">
               <a:rPr kumimoji="1" lang="ja-JP" altLang="en-US" smtClean="0"/>
-              <a:t>2023/5/28</a:t>
+              <a:t>2023/9/12</a:t>
             </a:fld>
             <a:endParaRPr kumimoji="1" lang="ja-JP" altLang="en-US"/>
           </a:p>
@@ -2636,7 +2636,7 @@
           <a:p>
             <a:fld id="{6E54FC5B-417A-4AFB-9851-210C2EBD3C69}" type="datetimeFigureOut">
               <a:rPr kumimoji="1" lang="ja-JP" altLang="en-US" smtClean="0"/>
-              <a:t>2023/5/28</a:t>
+              <a:t>2023/9/12</a:t>
             </a:fld>
             <a:endParaRPr kumimoji="1" lang="ja-JP" altLang="en-US"/>
           </a:p>
@@ -2924,7 +2924,7 @@
           <a:p>
             <a:fld id="{6E54FC5B-417A-4AFB-9851-210C2EBD3C69}" type="datetimeFigureOut">
               <a:rPr kumimoji="1" lang="ja-JP" altLang="en-US" smtClean="0"/>
-              <a:t>2023/5/28</a:t>
+              <a:t>2023/9/12</a:t>
             </a:fld>
             <a:endParaRPr kumimoji="1" lang="ja-JP" altLang="en-US"/>
           </a:p>
@@ -3197,7 +3197,7 @@
           <a:p>
             <a:fld id="{6E54FC5B-417A-4AFB-9851-210C2EBD3C69}" type="datetimeFigureOut">
               <a:rPr kumimoji="1" lang="ja-JP" altLang="en-US" smtClean="0"/>
-              <a:t>2023/5/28</a:t>
+              <a:t>2023/9/12</a:t>
             </a:fld>
             <a:endParaRPr kumimoji="1" lang="ja-JP" altLang="en-US"/>
           </a:p>
@@ -3629,7 +3629,7 @@
         <p:spPr>
           <a:xfrm>
             <a:off x="790536" y="265546"/>
-            <a:ext cx="674254" cy="5593388"/>
+            <a:ext cx="674254" cy="5374235"/>
           </a:xfrm>
           <a:prstGeom prst="roundRect">
             <a:avLst/>
@@ -3691,8 +3691,8 @@
         </p:nvSpPr>
         <p:spPr>
           <a:xfrm>
-            <a:off x="3101936" y="321430"/>
-            <a:ext cx="536476" cy="4734213"/>
+            <a:off x="3078055" y="472392"/>
+            <a:ext cx="536476" cy="3711030"/>
           </a:xfrm>
           <a:prstGeom prst="roundRect">
             <a:avLst/>
@@ -3743,7 +3743,7 @@
         </p:nvCxnSpPr>
         <p:spPr>
           <a:xfrm flipH="1">
-            <a:off x="1627294" y="3429000"/>
+            <a:off x="1617529" y="2810045"/>
             <a:ext cx="1276771" cy="0"/>
           </a:xfrm>
           <a:prstGeom prst="straightConnector1">
@@ -3771,100 +3771,12 @@
           </a:fontRef>
         </p:style>
       </p:cxnSp>
-      <p:cxnSp>
-        <p:nvCxnSpPr>
-          <p:cNvPr id="22" name="直線矢印コネクタ 21">
-            <a:extLst>
-              <a:ext uri="{FF2B5EF4-FFF2-40B4-BE49-F238E27FC236}">
-                <a16:creationId xmlns:a16="http://schemas.microsoft.com/office/drawing/2014/main" id="{C03A3D47-5976-9FB2-2922-E97D89402BA4}"/>
-              </a:ext>
-            </a:extLst>
-          </p:cNvPr>
-          <p:cNvCxnSpPr>
-            <a:cxnSpLocks/>
-          </p:cNvCxnSpPr>
-          <p:nvPr/>
-        </p:nvCxnSpPr>
-        <p:spPr>
-          <a:xfrm>
-            <a:off x="3699933" y="727344"/>
-            <a:ext cx="1490134" cy="2261"/>
-          </a:xfrm>
-          <a:prstGeom prst="straightConnector1">
-            <a:avLst/>
-          </a:prstGeom>
-          <a:ln w="19050">
-            <a:solidFill>
-              <a:schemeClr val="tx1"/>
-            </a:solidFill>
-            <a:tailEnd type="triangle"/>
-          </a:ln>
-        </p:spPr>
-        <p:style>
-          <a:lnRef idx="1">
-            <a:schemeClr val="accent1"/>
-          </a:lnRef>
-          <a:fillRef idx="0">
-            <a:schemeClr val="accent1"/>
-          </a:fillRef>
-          <a:effectRef idx="0">
-            <a:schemeClr val="accent1"/>
-          </a:effectRef>
-          <a:fontRef idx="minor">
-            <a:schemeClr val="tx1"/>
-          </a:fontRef>
-        </p:style>
-      </p:cxnSp>
-      <p:cxnSp>
-        <p:nvCxnSpPr>
-          <p:cNvPr id="27" name="直線矢印コネクタ 26">
-            <a:extLst>
-              <a:ext uri="{FF2B5EF4-FFF2-40B4-BE49-F238E27FC236}">
-                <a16:creationId xmlns:a16="http://schemas.microsoft.com/office/drawing/2014/main" id="{6C745CBB-9EED-A986-D354-5E8654852193}"/>
-              </a:ext>
-            </a:extLst>
-          </p:cNvPr>
-          <p:cNvCxnSpPr>
-            <a:cxnSpLocks/>
-          </p:cNvCxnSpPr>
-          <p:nvPr/>
-        </p:nvCxnSpPr>
-        <p:spPr>
-          <a:xfrm flipH="1">
-            <a:off x="3712632" y="998836"/>
-            <a:ext cx="1430867" cy="0"/>
-          </a:xfrm>
-          <a:prstGeom prst="straightConnector1">
-            <a:avLst/>
-          </a:prstGeom>
-          <a:ln w="19050">
-            <a:solidFill>
-              <a:schemeClr val="tx1"/>
-            </a:solidFill>
-            <a:tailEnd type="triangle"/>
-          </a:ln>
-        </p:spPr>
-        <p:style>
-          <a:lnRef idx="1">
-            <a:schemeClr val="accent1"/>
-          </a:lnRef>
-          <a:fillRef idx="0">
-            <a:schemeClr val="accent1"/>
-          </a:fillRef>
-          <a:effectRef idx="0">
-            <a:schemeClr val="accent1"/>
-          </a:effectRef>
-          <a:fontRef idx="minor">
-            <a:schemeClr val="tx1"/>
-          </a:fontRef>
-        </p:style>
-      </p:cxnSp>
-      <p:sp>
-        <p:nvSpPr>
-          <p:cNvPr id="28" name="四角形: 角を丸くする 27">
-            <a:extLst>
-              <a:ext uri="{FF2B5EF4-FFF2-40B4-BE49-F238E27FC236}">
-                <a16:creationId xmlns:a16="http://schemas.microsoft.com/office/drawing/2014/main" id="{00F1F273-A0B6-6934-AC2C-16EE181915CA}"/>
+      <p:sp>
+        <p:nvSpPr>
+          <p:cNvPr id="29" name="四角形: 角を丸くする 28">
+            <a:extLst>
+              <a:ext uri="{FF2B5EF4-FFF2-40B4-BE49-F238E27FC236}">
+                <a16:creationId xmlns:a16="http://schemas.microsoft.com/office/drawing/2014/main" id="{E28B5898-DE5B-834A-89CE-2853C5E5910A}"/>
               </a:ext>
             </a:extLst>
           </p:cNvPr>
@@ -3873,8 +3785,8 @@
         </p:nvSpPr>
         <p:spPr>
           <a:xfrm>
-            <a:off x="5256927" y="265546"/>
-            <a:ext cx="900000" cy="1033200"/>
+            <a:off x="4436539" y="655977"/>
+            <a:ext cx="900000" cy="720000"/>
           </a:xfrm>
           <a:prstGeom prst="roundRect">
             <a:avLst/>
@@ -3902,9 +3814,17 @@
           <a:p>
             <a:pPr algn="ctr"/>
             <a:r>
-              <a:rPr kumimoji="1" lang="en-US" altLang="ja-JP" sz="1000" dirty="0"/>
-              <a:t>DX11</a:t>
-            </a:r>
+              <a:rPr lang="en-US" altLang="ja-JP" sz="1000" dirty="0"/>
+              <a:t>Video</a:t>
+            </a:r>
+          </a:p>
+          <a:p>
+            <a:pPr algn="ctr"/>
+            <a:r>
+              <a:rPr lang="en-US" altLang="ja-JP" sz="1000" dirty="0"/>
+              <a:t>Capture</a:t>
+            </a:r>
+            <a:endParaRPr kumimoji="1" lang="en-US" altLang="ja-JP" sz="1000" dirty="0"/>
           </a:p>
           <a:p>
             <a:pPr algn="ctr"/>
@@ -3920,12 +3840,144 @@
           </a:p>
         </p:txBody>
       </p:sp>
-      <p:sp>
-        <p:nvSpPr>
-          <p:cNvPr id="29" name="四角形: 角を丸くする 28">
-            <a:extLst>
-              <a:ext uri="{FF2B5EF4-FFF2-40B4-BE49-F238E27FC236}">
-                <a16:creationId xmlns:a16="http://schemas.microsoft.com/office/drawing/2014/main" id="{E28B5898-DE5B-834A-89CE-2853C5E5910A}"/>
+      <p:cxnSp>
+        <p:nvCxnSpPr>
+          <p:cNvPr id="33" name="直線矢印コネクタ 32">
+            <a:extLst>
+              <a:ext uri="{FF2B5EF4-FFF2-40B4-BE49-F238E27FC236}">
+                <a16:creationId xmlns:a16="http://schemas.microsoft.com/office/drawing/2014/main" id="{E40D91E2-4843-0C62-AE51-B78AC22ACEF6}"/>
+              </a:ext>
+            </a:extLst>
+          </p:cNvPr>
+          <p:cNvCxnSpPr>
+            <a:cxnSpLocks/>
+          </p:cNvCxnSpPr>
+          <p:nvPr/>
+        </p:nvCxnSpPr>
+        <p:spPr>
+          <a:xfrm>
+            <a:off x="1564435" y="1222334"/>
+            <a:ext cx="1276771" cy="0"/>
+          </a:xfrm>
+          <a:prstGeom prst="straightConnector1">
+            <a:avLst/>
+          </a:prstGeom>
+          <a:ln w="19050">
+            <a:solidFill>
+              <a:schemeClr val="tx1"/>
+            </a:solidFill>
+            <a:tailEnd type="triangle"/>
+          </a:ln>
+        </p:spPr>
+        <p:style>
+          <a:lnRef idx="1">
+            <a:schemeClr val="accent1"/>
+          </a:lnRef>
+          <a:fillRef idx="0">
+            <a:schemeClr val="accent1"/>
+          </a:fillRef>
+          <a:effectRef idx="0">
+            <a:schemeClr val="accent1"/>
+          </a:effectRef>
+          <a:fontRef idx="minor">
+            <a:schemeClr val="tx1"/>
+          </a:fontRef>
+        </p:style>
+      </p:cxnSp>
+      <p:cxnSp>
+        <p:nvCxnSpPr>
+          <p:cNvPr id="44" name="直線矢印コネクタ 43">
+            <a:extLst>
+              <a:ext uri="{FF2B5EF4-FFF2-40B4-BE49-F238E27FC236}">
+                <a16:creationId xmlns:a16="http://schemas.microsoft.com/office/drawing/2014/main" id="{BC8EAF2C-001F-37DA-FAAF-3BDF287A86E2}"/>
+              </a:ext>
+            </a:extLst>
+          </p:cNvPr>
+          <p:cNvCxnSpPr>
+            <a:cxnSpLocks/>
+          </p:cNvCxnSpPr>
+          <p:nvPr/>
+        </p:nvCxnSpPr>
+        <p:spPr>
+          <a:xfrm>
+            <a:off x="1576127" y="4730160"/>
+            <a:ext cx="2726536" cy="0"/>
+          </a:xfrm>
+          <a:prstGeom prst="straightConnector1">
+            <a:avLst/>
+          </a:prstGeom>
+          <a:ln w="19050">
+            <a:solidFill>
+              <a:schemeClr val="tx1"/>
+            </a:solidFill>
+            <a:tailEnd type="triangle"/>
+          </a:ln>
+        </p:spPr>
+        <p:style>
+          <a:lnRef idx="1">
+            <a:schemeClr val="accent1"/>
+          </a:lnRef>
+          <a:fillRef idx="0">
+            <a:schemeClr val="accent1"/>
+          </a:fillRef>
+          <a:effectRef idx="0">
+            <a:schemeClr val="accent1"/>
+          </a:effectRef>
+          <a:fontRef idx="minor">
+            <a:schemeClr val="tx1"/>
+          </a:fontRef>
+        </p:style>
+      </p:cxnSp>
+      <p:cxnSp>
+        <p:nvCxnSpPr>
+          <p:cNvPr id="45" name="直線矢印コネクタ 44">
+            <a:extLst>
+              <a:ext uri="{FF2B5EF4-FFF2-40B4-BE49-F238E27FC236}">
+                <a16:creationId xmlns:a16="http://schemas.microsoft.com/office/drawing/2014/main" id="{19730D09-14D9-7C47-8A15-AFB9F0D80EDD}"/>
+              </a:ext>
+            </a:extLst>
+          </p:cNvPr>
+          <p:cNvCxnSpPr>
+            <a:cxnSpLocks/>
+          </p:cNvCxnSpPr>
+          <p:nvPr/>
+        </p:nvCxnSpPr>
+        <p:spPr>
+          <a:xfrm flipH="1">
+            <a:off x="1563201" y="5038969"/>
+            <a:ext cx="2739462" cy="0"/>
+          </a:xfrm>
+          <a:prstGeom prst="straightConnector1">
+            <a:avLst/>
+          </a:prstGeom>
+          <a:ln w="19050">
+            <a:solidFill>
+              <a:schemeClr val="tx1"/>
+            </a:solidFill>
+            <a:tailEnd type="triangle"/>
+          </a:ln>
+        </p:spPr>
+        <p:style>
+          <a:lnRef idx="1">
+            <a:schemeClr val="accent1"/>
+          </a:lnRef>
+          <a:fillRef idx="0">
+            <a:schemeClr val="accent1"/>
+          </a:fillRef>
+          <a:effectRef idx="0">
+            <a:schemeClr val="accent1"/>
+          </a:effectRef>
+          <a:fontRef idx="minor">
+            <a:schemeClr val="tx1"/>
+          </a:fontRef>
+        </p:style>
+      </p:cxnSp>
+      <p:sp>
+        <p:nvSpPr>
+          <p:cNvPr id="54" name="四角形: 角を丸くする 53">
+            <a:extLst>
+              <a:ext uri="{FF2B5EF4-FFF2-40B4-BE49-F238E27FC236}">
+                <a16:creationId xmlns:a16="http://schemas.microsoft.com/office/drawing/2014/main" id="{A27EC0DE-B57A-7E5A-AF96-C709768C3B79}"/>
               </a:ext>
             </a:extLst>
           </p:cNvPr>
@@ -3934,12 +3986,76 @@
         </p:nvSpPr>
         <p:spPr>
           <a:xfrm>
-            <a:off x="5258294" y="1446135"/>
-            <a:ext cx="900000" cy="720000"/>
+            <a:off x="6606255" y="885710"/>
+            <a:ext cx="2028879" cy="393473"/>
           </a:xfrm>
           <a:prstGeom prst="roundRect">
             <a:avLst/>
           </a:prstGeom>
+        </p:spPr>
+        <p:style>
+          <a:lnRef idx="2">
+            <a:schemeClr val="accent4">
+              <a:shade val="50000"/>
+            </a:schemeClr>
+          </a:lnRef>
+          <a:fillRef idx="1">
+            <a:schemeClr val="accent4"/>
+          </a:fillRef>
+          <a:effectRef idx="0">
+            <a:schemeClr val="accent4"/>
+          </a:effectRef>
+          <a:fontRef idx="minor">
+            <a:schemeClr val="lt1"/>
+          </a:fontRef>
+        </p:style>
+        <p:txBody>
+          <a:bodyPr rtlCol="0" anchor="ctr"/>
+          <a:lstStyle/>
+          <a:p>
+            <a:pPr algn="ctr"/>
+            <a:r>
+              <a:rPr kumimoji="1" lang="en-US" altLang="ja-JP" sz="1000" dirty="0" err="1">
+                <a:solidFill>
+                  <a:schemeClr val="tx1"/>
+                </a:solidFill>
+              </a:rPr>
+              <a:t>VideoCaptureCallback</a:t>
+            </a:r>
+            <a:endParaRPr kumimoji="1" lang="ja-JP" altLang="en-US" sz="1000" dirty="0">
+              <a:solidFill>
+                <a:schemeClr val="tx1"/>
+              </a:solidFill>
+            </a:endParaRPr>
+          </a:p>
+        </p:txBody>
+      </p:sp>
+      <p:sp>
+        <p:nvSpPr>
+          <p:cNvPr id="66" name="四角形: 角を丸くする 65">
+            <a:extLst>
+              <a:ext uri="{FF2B5EF4-FFF2-40B4-BE49-F238E27FC236}">
+                <a16:creationId xmlns:a16="http://schemas.microsoft.com/office/drawing/2014/main" id="{2B8AFE59-B7B0-3136-72DE-835974A47E21}"/>
+              </a:ext>
+            </a:extLst>
+          </p:cNvPr>
+          <p:cNvSpPr/>
+          <p:nvPr/>
+        </p:nvSpPr>
+        <p:spPr>
+          <a:xfrm>
+            <a:off x="9604473" y="1941758"/>
+            <a:ext cx="1497025" cy="180000"/>
+          </a:xfrm>
+          <a:prstGeom prst="roundRect">
+            <a:avLst/>
+          </a:prstGeom>
+          <a:noFill/>
+          <a:ln>
+            <a:solidFill>
+              <a:schemeClr val="tx1"/>
+            </a:solidFill>
+          </a:ln>
         </p:spPr>
         <p:style>
           <a:lnRef idx="2">
@@ -3963,38 +4079,265 @@
           <a:p>
             <a:pPr algn="ctr"/>
             <a:r>
-              <a:rPr lang="en-US" altLang="ja-JP" sz="1000" dirty="0"/>
-              <a:t>Video</a:t>
-            </a:r>
-          </a:p>
+              <a:rPr kumimoji="1" lang="en-US" altLang="ja-JP" sz="1000" dirty="0">
+                <a:solidFill>
+                  <a:schemeClr val="tx1"/>
+                </a:solidFill>
+              </a:rPr>
+              <a:t>Mesh</a:t>
+            </a:r>
+            <a:endParaRPr kumimoji="1" lang="ja-JP" altLang="en-US" sz="1000" dirty="0">
+              <a:solidFill>
+                <a:schemeClr val="tx1"/>
+              </a:solidFill>
+            </a:endParaRPr>
+          </a:p>
+        </p:txBody>
+      </p:sp>
+      <p:sp>
+        <p:nvSpPr>
+          <p:cNvPr id="67" name="四角形: 角を丸くする 66">
+            <a:extLst>
+              <a:ext uri="{FF2B5EF4-FFF2-40B4-BE49-F238E27FC236}">
+                <a16:creationId xmlns:a16="http://schemas.microsoft.com/office/drawing/2014/main" id="{99D8C456-6F70-097A-87B0-9C73D28FE597}"/>
+              </a:ext>
+            </a:extLst>
+          </p:cNvPr>
+          <p:cNvSpPr/>
+          <p:nvPr/>
+        </p:nvSpPr>
+        <p:spPr>
+          <a:xfrm>
+            <a:off x="9604473" y="2188525"/>
+            <a:ext cx="1497024" cy="180000"/>
+          </a:xfrm>
+          <a:prstGeom prst="roundRect">
+            <a:avLst/>
+          </a:prstGeom>
+          <a:noFill/>
+          <a:ln>
+            <a:solidFill>
+              <a:schemeClr val="tx1"/>
+            </a:solidFill>
+          </a:ln>
+        </p:spPr>
+        <p:style>
+          <a:lnRef idx="2">
+            <a:schemeClr val="accent6">
+              <a:shade val="50000"/>
+            </a:schemeClr>
+          </a:lnRef>
+          <a:fillRef idx="1">
+            <a:schemeClr val="accent6"/>
+          </a:fillRef>
+          <a:effectRef idx="0">
+            <a:schemeClr val="accent6"/>
+          </a:effectRef>
+          <a:fontRef idx="minor">
+            <a:schemeClr val="lt1"/>
+          </a:fontRef>
+        </p:style>
+        <p:txBody>
+          <a:bodyPr rtlCol="0" anchor="ctr"/>
+          <a:lstStyle/>
           <a:p>
             <a:pPr algn="ctr"/>
             <a:r>
-              <a:rPr lang="en-US" altLang="ja-JP" sz="1000" dirty="0"/>
-              <a:t>Capture</a:t>
-            </a:r>
-            <a:endParaRPr kumimoji="1" lang="en-US" altLang="ja-JP" sz="1000" dirty="0"/>
-          </a:p>
+              <a:rPr lang="en-US" altLang="ja-JP" sz="1000" dirty="0">
+                <a:solidFill>
+                  <a:schemeClr val="tx1"/>
+                </a:solidFill>
+              </a:rPr>
+              <a:t>Pipeline</a:t>
+            </a:r>
+            <a:endParaRPr kumimoji="1" lang="ja-JP" altLang="en-US" sz="1000" dirty="0">
+              <a:solidFill>
+                <a:schemeClr val="tx1"/>
+              </a:solidFill>
+            </a:endParaRPr>
+          </a:p>
+        </p:txBody>
+      </p:sp>
+      <p:sp>
+        <p:nvSpPr>
+          <p:cNvPr id="68" name="四角形: 角を丸くする 67">
+            <a:extLst>
+              <a:ext uri="{FF2B5EF4-FFF2-40B4-BE49-F238E27FC236}">
+                <a16:creationId xmlns:a16="http://schemas.microsoft.com/office/drawing/2014/main" id="{5E8FB3EB-9C3E-E684-29C4-2AFDBF0C2596}"/>
+              </a:ext>
+            </a:extLst>
+          </p:cNvPr>
+          <p:cNvSpPr/>
+          <p:nvPr/>
+        </p:nvSpPr>
+        <p:spPr>
+          <a:xfrm>
+            <a:off x="1563201" y="5827582"/>
+            <a:ext cx="3169243" cy="440774"/>
+          </a:xfrm>
+          <a:prstGeom prst="roundRect">
+            <a:avLst/>
+          </a:prstGeom>
+        </p:spPr>
+        <p:style>
+          <a:lnRef idx="2">
+            <a:schemeClr val="accent3">
+              <a:shade val="50000"/>
+            </a:schemeClr>
+          </a:lnRef>
+          <a:fillRef idx="1">
+            <a:schemeClr val="accent3"/>
+          </a:fillRef>
+          <a:effectRef idx="0">
+            <a:schemeClr val="accent3"/>
+          </a:effectRef>
+          <a:fontRef idx="minor">
+            <a:schemeClr val="lt1"/>
+          </a:fontRef>
+        </p:style>
+        <p:txBody>
+          <a:bodyPr rtlCol="0" anchor="ctr"/>
+          <a:lstStyle/>
           <a:p>
             <a:pPr algn="ctr"/>
             <a:r>
-              <a:rPr lang="en-US" altLang="ja-JP" sz="1000" dirty="0"/>
-              <a:t>M</a:t>
-            </a:r>
-            <a:r>
-              <a:rPr kumimoji="1" lang="en-US" altLang="ja-JP" sz="1000" dirty="0"/>
-              <a:t>anager</a:t>
-            </a:r>
-            <a:endParaRPr kumimoji="1" lang="ja-JP" altLang="en-US" sz="1000" dirty="0"/>
+              <a:rPr lang="en-US" altLang="ja-JP" sz="1000" dirty="0">
+                <a:solidFill>
+                  <a:schemeClr val="bg1"/>
+                </a:solidFill>
+              </a:rPr>
+              <a:t>Win32API</a:t>
+            </a:r>
+            <a:endParaRPr kumimoji="1" lang="ja-JP" altLang="en-US" sz="1000" dirty="0">
+              <a:solidFill>
+                <a:schemeClr val="bg1"/>
+              </a:solidFill>
+            </a:endParaRPr>
+          </a:p>
+        </p:txBody>
+      </p:sp>
+      <p:sp>
+        <p:nvSpPr>
+          <p:cNvPr id="69" name="四角形: 角を丸くする 68">
+            <a:extLst>
+              <a:ext uri="{FF2B5EF4-FFF2-40B4-BE49-F238E27FC236}">
+                <a16:creationId xmlns:a16="http://schemas.microsoft.com/office/drawing/2014/main" id="{BE13F192-3D10-8C70-19B7-113312EA7E22}"/>
+              </a:ext>
+            </a:extLst>
+          </p:cNvPr>
+          <p:cNvSpPr/>
+          <p:nvPr/>
+        </p:nvSpPr>
+        <p:spPr>
+          <a:xfrm>
+            <a:off x="4914397" y="5831456"/>
+            <a:ext cx="3169243" cy="440774"/>
+          </a:xfrm>
+          <a:prstGeom prst="roundRect">
+            <a:avLst/>
+          </a:prstGeom>
+        </p:spPr>
+        <p:style>
+          <a:lnRef idx="2">
+            <a:schemeClr val="accent3">
+              <a:shade val="50000"/>
+            </a:schemeClr>
+          </a:lnRef>
+          <a:fillRef idx="1">
+            <a:schemeClr val="accent3"/>
+          </a:fillRef>
+          <a:effectRef idx="0">
+            <a:schemeClr val="accent3"/>
+          </a:effectRef>
+          <a:fontRef idx="minor">
+            <a:schemeClr val="lt1"/>
+          </a:fontRef>
+        </p:style>
+        <p:txBody>
+          <a:bodyPr rtlCol="0" anchor="ctr"/>
+          <a:lstStyle/>
+          <a:p>
+            <a:pPr algn="ctr"/>
+            <a:r>
+              <a:rPr lang="en-US" altLang="ja-JP" sz="1000" dirty="0">
+                <a:solidFill>
+                  <a:schemeClr val="bg1"/>
+                </a:solidFill>
+              </a:rPr>
+              <a:t>Media Foundation</a:t>
+            </a:r>
+            <a:endParaRPr kumimoji="1" lang="ja-JP" altLang="en-US" sz="1000" dirty="0">
+              <a:solidFill>
+                <a:schemeClr val="bg1"/>
+              </a:solidFill>
+            </a:endParaRPr>
+          </a:p>
+        </p:txBody>
+      </p:sp>
+      <p:sp>
+        <p:nvSpPr>
+          <p:cNvPr id="70" name="四角形: 角を丸くする 69">
+            <a:extLst>
+              <a:ext uri="{FF2B5EF4-FFF2-40B4-BE49-F238E27FC236}">
+                <a16:creationId xmlns:a16="http://schemas.microsoft.com/office/drawing/2014/main" id="{A2BBDD5D-9C38-8111-31BD-42A4D892E4DA}"/>
+              </a:ext>
+            </a:extLst>
+          </p:cNvPr>
+          <p:cNvSpPr/>
+          <p:nvPr/>
+        </p:nvSpPr>
+        <p:spPr>
+          <a:xfrm>
+            <a:off x="8265593" y="5827582"/>
+            <a:ext cx="3169243" cy="440774"/>
+          </a:xfrm>
+          <a:prstGeom prst="roundRect">
+            <a:avLst/>
+          </a:prstGeom>
+        </p:spPr>
+        <p:style>
+          <a:lnRef idx="2">
+            <a:schemeClr val="accent3">
+              <a:shade val="50000"/>
+            </a:schemeClr>
+          </a:lnRef>
+          <a:fillRef idx="1">
+            <a:schemeClr val="accent3"/>
+          </a:fillRef>
+          <a:effectRef idx="0">
+            <a:schemeClr val="accent3"/>
+          </a:effectRef>
+          <a:fontRef idx="minor">
+            <a:schemeClr val="lt1"/>
+          </a:fontRef>
+        </p:style>
+        <p:txBody>
+          <a:bodyPr rtlCol="0" anchor="ctr"/>
+          <a:lstStyle/>
+          <a:p>
+            <a:pPr algn="ctr"/>
+            <a:r>
+              <a:rPr lang="en-US" altLang="ja-JP" sz="1000" dirty="0">
+                <a:solidFill>
+                  <a:schemeClr val="bg1"/>
+                </a:solidFill>
+              </a:rPr>
+              <a:t>DirectX 11</a:t>
+            </a:r>
+            <a:endParaRPr kumimoji="1" lang="ja-JP" altLang="en-US" sz="1000" dirty="0">
+              <a:solidFill>
+                <a:schemeClr val="bg1"/>
+              </a:solidFill>
+            </a:endParaRPr>
           </a:p>
         </p:txBody>
       </p:sp>
       <p:cxnSp>
         <p:nvCxnSpPr>
-          <p:cNvPr id="33" name="直線矢印コネクタ 32">
-            <a:extLst>
-              <a:ext uri="{FF2B5EF4-FFF2-40B4-BE49-F238E27FC236}">
-                <a16:creationId xmlns:a16="http://schemas.microsoft.com/office/drawing/2014/main" id="{E40D91E2-4843-0C62-AE51-B78AC22ACEF6}"/>
+          <p:cNvPr id="88" name="直線矢印コネクタ 87">
+            <a:extLst>
+              <a:ext uri="{FF2B5EF4-FFF2-40B4-BE49-F238E27FC236}">
+                <a16:creationId xmlns:a16="http://schemas.microsoft.com/office/drawing/2014/main" id="{916B5A5E-C36D-3233-0CCA-BE9476CAF528}"/>
               </a:ext>
             </a:extLst>
           </p:cNvPr>
@@ -4005,8 +4348,8 @@
         </p:nvCxnSpPr>
         <p:spPr>
           <a:xfrm>
-            <a:off x="1627295" y="1243059"/>
-            <a:ext cx="1276771" cy="0"/>
+            <a:off x="3729461" y="1034551"/>
+            <a:ext cx="615137" cy="0"/>
           </a:xfrm>
           <a:prstGeom prst="straightConnector1">
             <a:avLst/>
@@ -4035,10 +4378,10 @@
       </p:cxnSp>
       <p:cxnSp>
         <p:nvCxnSpPr>
-          <p:cNvPr id="44" name="直線矢印コネクタ 43">
-            <a:extLst>
-              <a:ext uri="{FF2B5EF4-FFF2-40B4-BE49-F238E27FC236}">
-                <a16:creationId xmlns:a16="http://schemas.microsoft.com/office/drawing/2014/main" id="{BC8EAF2C-001F-37DA-FAAF-3BDF287A86E2}"/>
+          <p:cNvPr id="90" name="直線矢印コネクタ 89">
+            <a:extLst>
+              <a:ext uri="{FF2B5EF4-FFF2-40B4-BE49-F238E27FC236}">
+                <a16:creationId xmlns:a16="http://schemas.microsoft.com/office/drawing/2014/main" id="{50061BA6-18B6-EF44-EF15-53A65493D9A1}"/>
               </a:ext>
             </a:extLst>
           </p:cNvPr>
@@ -4049,8 +4392,8 @@
         </p:nvCxnSpPr>
         <p:spPr>
           <a:xfrm>
-            <a:off x="1552127" y="5337315"/>
-            <a:ext cx="3647438" cy="0"/>
+            <a:off x="3729461" y="1951472"/>
+            <a:ext cx="615137" cy="0"/>
           </a:xfrm>
           <a:prstGeom prst="straightConnector1">
             <a:avLst/>
@@ -4079,10 +4422,10 @@
       </p:cxnSp>
       <p:cxnSp>
         <p:nvCxnSpPr>
-          <p:cNvPr id="45" name="直線矢印コネクタ 44">
-            <a:extLst>
-              <a:ext uri="{FF2B5EF4-FFF2-40B4-BE49-F238E27FC236}">
-                <a16:creationId xmlns:a16="http://schemas.microsoft.com/office/drawing/2014/main" id="{19730D09-14D9-7C47-8A15-AFB9F0D80EDD}"/>
+          <p:cNvPr id="94" name="直線矢印コネクタ 93">
+            <a:extLst>
+              <a:ext uri="{FF2B5EF4-FFF2-40B4-BE49-F238E27FC236}">
+                <a16:creationId xmlns:a16="http://schemas.microsoft.com/office/drawing/2014/main" id="{C6446206-DC95-35E3-5F43-1DC80A251371}"/>
               </a:ext>
             </a:extLst>
           </p:cNvPr>
@@ -4092,9 +4435,9 @@
           <p:nvPr/>
         </p:nvCxnSpPr>
         <p:spPr>
-          <a:xfrm flipH="1">
-            <a:off x="1543660" y="5558605"/>
-            <a:ext cx="3620728" cy="0"/>
+          <a:xfrm>
+            <a:off x="5463065" y="1062340"/>
+            <a:ext cx="940098" cy="0"/>
           </a:xfrm>
           <a:prstGeom prst="straightConnector1">
             <a:avLst/>
@@ -4123,10 +4466,10 @@
       </p:cxnSp>
       <p:sp>
         <p:nvSpPr>
-          <p:cNvPr id="54" name="四角形: 角を丸くする 53">
-            <a:extLst>
-              <a:ext uri="{FF2B5EF4-FFF2-40B4-BE49-F238E27FC236}">
-                <a16:creationId xmlns:a16="http://schemas.microsoft.com/office/drawing/2014/main" id="{A27EC0DE-B57A-7E5A-AF96-C709768C3B79}"/>
+          <p:cNvPr id="3" name="四角形: 角を丸くする 2">
+            <a:extLst>
+              <a:ext uri="{FF2B5EF4-FFF2-40B4-BE49-F238E27FC236}">
+                <a16:creationId xmlns:a16="http://schemas.microsoft.com/office/drawing/2014/main" id="{4712B481-CC40-70FF-AB40-8FF97FBFB56D}"/>
               </a:ext>
             </a:extLst>
           </p:cNvPr>
@@ -4135,8 +4478,8 @@
         </p:nvSpPr>
         <p:spPr>
           <a:xfrm>
-            <a:off x="7847894" y="1653902"/>
-            <a:ext cx="2668914" cy="393473"/>
+            <a:off x="6612280" y="1798438"/>
+            <a:ext cx="2028879" cy="393473"/>
           </a:xfrm>
           <a:prstGeom prst="roundRect">
             <a:avLst/>
@@ -4164,12 +4507,12 @@
           <a:p>
             <a:pPr algn="ctr"/>
             <a:r>
-              <a:rPr kumimoji="1" lang="en-US" altLang="ja-JP" sz="1000" dirty="0" err="1">
+              <a:rPr lang="en-US" altLang="ja-JP" sz="1000" dirty="0" err="1">
                 <a:solidFill>
                   <a:schemeClr val="tx1"/>
                 </a:solidFill>
               </a:rPr>
-              <a:t>VideoCaptureCallback</a:t>
+              <a:t>AudioCaptureCallback</a:t>
             </a:r>
             <a:endParaRPr kumimoji="1" lang="ja-JP" altLang="en-US" sz="1000" dirty="0">
               <a:solidFill>
@@ -4179,12 +4522,57 @@
           </a:p>
         </p:txBody>
       </p:sp>
-      <p:sp>
-        <p:nvSpPr>
-          <p:cNvPr id="66" name="四角形: 角を丸くする 65">
-            <a:extLst>
-              <a:ext uri="{FF2B5EF4-FFF2-40B4-BE49-F238E27FC236}">
-                <a16:creationId xmlns:a16="http://schemas.microsoft.com/office/drawing/2014/main" id="{2B8AFE59-B7B0-3136-72DE-835974A47E21}"/>
+      <p:cxnSp>
+        <p:nvCxnSpPr>
+          <p:cNvPr id="6" name="直線矢印コネクタ 5">
+            <a:extLst>
+              <a:ext uri="{FF2B5EF4-FFF2-40B4-BE49-F238E27FC236}">
+                <a16:creationId xmlns:a16="http://schemas.microsoft.com/office/drawing/2014/main" id="{361E017B-6C3D-77C0-46F3-4D9AB1B3B31B}"/>
+              </a:ext>
+            </a:extLst>
+          </p:cNvPr>
+          <p:cNvCxnSpPr>
+            <a:cxnSpLocks/>
+            <a:stCxn id="81" idx="4"/>
+          </p:cNvCxnSpPr>
+          <p:nvPr/>
+        </p:nvCxnSpPr>
+        <p:spPr>
+          <a:xfrm rot="5400000">
+            <a:off x="6307599" y="1478094"/>
+            <a:ext cx="500533" cy="2198999"/>
+          </a:xfrm>
+          <a:prstGeom prst="bentConnector2">
+            <a:avLst/>
+          </a:prstGeom>
+          <a:ln w="19050">
+            <a:solidFill>
+              <a:schemeClr val="tx1"/>
+            </a:solidFill>
+            <a:tailEnd type="triangle"/>
+          </a:ln>
+        </p:spPr>
+        <p:style>
+          <a:lnRef idx="1">
+            <a:schemeClr val="accent1"/>
+          </a:lnRef>
+          <a:fillRef idx="0">
+            <a:schemeClr val="accent1"/>
+          </a:fillRef>
+          <a:effectRef idx="0">
+            <a:schemeClr val="accent1"/>
+          </a:effectRef>
+          <a:fontRef idx="minor">
+            <a:schemeClr val="tx1"/>
+          </a:fontRef>
+        </p:style>
+      </p:cxnSp>
+      <p:sp>
+        <p:nvSpPr>
+          <p:cNvPr id="7" name="四角形: 角を丸くする 6">
+            <a:extLst>
+              <a:ext uri="{FF2B5EF4-FFF2-40B4-BE49-F238E27FC236}">
+                <a16:creationId xmlns:a16="http://schemas.microsoft.com/office/drawing/2014/main" id="{5486FB98-B9BE-5AD7-975A-60048951719D}"/>
               </a:ext>
             </a:extLst>
           </p:cNvPr>
@@ -4193,18 +4581,12 @@
         </p:nvSpPr>
         <p:spPr>
           <a:xfrm>
-            <a:off x="7847894" y="561716"/>
-            <a:ext cx="1497025" cy="180000"/>
+            <a:off x="4430514" y="2525938"/>
+            <a:ext cx="900000" cy="1033200"/>
           </a:xfrm>
           <a:prstGeom prst="roundRect">
             <a:avLst/>
           </a:prstGeom>
-          <a:noFill/>
-          <a:ln>
-            <a:solidFill>
-              <a:schemeClr val="tx1"/>
-            </a:solidFill>
-          </a:ln>
         </p:spPr>
         <p:style>
           <a:lnRef idx="2">
@@ -4228,27 +4610,46 @@
           <a:p>
             <a:pPr algn="ctr"/>
             <a:r>
-              <a:rPr kumimoji="1" lang="en-US" altLang="ja-JP" sz="1000" dirty="0">
-                <a:solidFill>
-                  <a:schemeClr val="tx1"/>
-                </a:solidFill>
-              </a:rPr>
-              <a:t>Mesh</a:t>
-            </a:r>
-            <a:endParaRPr kumimoji="1" lang="ja-JP" altLang="en-US" sz="1000" dirty="0">
-              <a:solidFill>
-                <a:schemeClr val="tx1"/>
-              </a:solidFill>
-            </a:endParaRPr>
-          </a:p>
-        </p:txBody>
-      </p:sp>
-      <p:sp>
-        <p:nvSpPr>
-          <p:cNvPr id="67" name="四角形: 角を丸くする 66">
-            <a:extLst>
-              <a:ext uri="{FF2B5EF4-FFF2-40B4-BE49-F238E27FC236}">
-                <a16:creationId xmlns:a16="http://schemas.microsoft.com/office/drawing/2014/main" id="{99D8C456-6F70-097A-87B0-9C73D28FE597}"/>
+              <a:rPr kumimoji="1" lang="en-US" altLang="ja-JP" sz="1000" dirty="0"/>
+              <a:t>Audio</a:t>
+            </a:r>
+          </a:p>
+          <a:p>
+            <a:pPr algn="ctr"/>
+            <a:r>
+              <a:rPr lang="en-US" altLang="ja-JP" sz="1000" dirty="0"/>
+              <a:t>Output</a:t>
+            </a:r>
+            <a:endParaRPr kumimoji="1" lang="en-US" altLang="ja-JP" sz="1000" dirty="0"/>
+          </a:p>
+          <a:p>
+            <a:pPr algn="ctr"/>
+            <a:r>
+              <a:rPr lang="en-US" altLang="ja-JP" sz="1000" dirty="0"/>
+              <a:t>Device</a:t>
+            </a:r>
+            <a:endParaRPr kumimoji="1" lang="en-US" altLang="ja-JP" sz="1000" dirty="0"/>
+          </a:p>
+          <a:p>
+            <a:pPr algn="ctr"/>
+            <a:r>
+              <a:rPr lang="en-US" altLang="ja-JP" sz="1000" dirty="0"/>
+              <a:t>M</a:t>
+            </a:r>
+            <a:r>
+              <a:rPr kumimoji="1" lang="en-US" altLang="ja-JP" sz="1000" dirty="0"/>
+              <a:t>anager</a:t>
+            </a:r>
+            <a:endParaRPr kumimoji="1" lang="ja-JP" altLang="en-US" sz="1000" dirty="0"/>
+          </a:p>
+        </p:txBody>
+      </p:sp>
+      <p:sp>
+        <p:nvSpPr>
+          <p:cNvPr id="8" name="四角形: 角を丸くする 7">
+            <a:extLst>
+              <a:ext uri="{FF2B5EF4-FFF2-40B4-BE49-F238E27FC236}">
+                <a16:creationId xmlns:a16="http://schemas.microsoft.com/office/drawing/2014/main" id="{FB36455A-D2A1-D160-5ACD-07DFC0DADEF9}"/>
               </a:ext>
             </a:extLst>
           </p:cNvPr>
@@ -4257,18 +4658,12 @@
         </p:nvSpPr>
         <p:spPr>
           <a:xfrm>
-            <a:off x="7847894" y="808483"/>
-            <a:ext cx="1497024" cy="180000"/>
+            <a:off x="4430514" y="3724392"/>
+            <a:ext cx="900000" cy="1495169"/>
           </a:xfrm>
           <a:prstGeom prst="roundRect">
             <a:avLst/>
           </a:prstGeom>
-          <a:noFill/>
-          <a:ln>
-            <a:solidFill>
-              <a:schemeClr val="tx1"/>
-            </a:solidFill>
-          </a:ln>
         </p:spPr>
         <p:style>
           <a:lnRef idx="2">
@@ -4292,201 +4687,33 @@
           <a:p>
             <a:pPr algn="ctr"/>
             <a:r>
-              <a:rPr lang="en-US" altLang="ja-JP" sz="1000" dirty="0">
-                <a:solidFill>
-                  <a:schemeClr val="tx1"/>
-                </a:solidFill>
-              </a:rPr>
-              <a:t>Pipeline</a:t>
-            </a:r>
-            <a:endParaRPr kumimoji="1" lang="ja-JP" altLang="en-US" sz="1000" dirty="0">
-              <a:solidFill>
-                <a:schemeClr val="tx1"/>
-              </a:solidFill>
-            </a:endParaRPr>
-          </a:p>
-        </p:txBody>
-      </p:sp>
-      <p:sp>
-        <p:nvSpPr>
-          <p:cNvPr id="68" name="四角形: 角を丸くする 67">
-            <a:extLst>
-              <a:ext uri="{FF2B5EF4-FFF2-40B4-BE49-F238E27FC236}">
-                <a16:creationId xmlns:a16="http://schemas.microsoft.com/office/drawing/2014/main" id="{5E8FB3EB-9C3E-E684-29C4-2AFDBF0C2596}"/>
-              </a:ext>
-            </a:extLst>
-          </p:cNvPr>
-          <p:cNvSpPr/>
-          <p:nvPr/>
-        </p:nvSpPr>
-        <p:spPr>
-          <a:xfrm>
-            <a:off x="1563201" y="6069138"/>
-            <a:ext cx="3169243" cy="440774"/>
-          </a:xfrm>
-          <a:prstGeom prst="roundRect">
-            <a:avLst/>
-          </a:prstGeom>
-        </p:spPr>
-        <p:style>
-          <a:lnRef idx="2">
-            <a:schemeClr val="accent3">
-              <a:shade val="50000"/>
-            </a:schemeClr>
-          </a:lnRef>
-          <a:fillRef idx="1">
-            <a:schemeClr val="accent3"/>
-          </a:fillRef>
-          <a:effectRef idx="0">
-            <a:schemeClr val="accent3"/>
-          </a:effectRef>
-          <a:fontRef idx="minor">
-            <a:schemeClr val="lt1"/>
-          </a:fontRef>
-        </p:style>
-        <p:txBody>
-          <a:bodyPr rtlCol="0" anchor="ctr"/>
-          <a:lstStyle/>
+              <a:rPr kumimoji="1" lang="en-US" altLang="ja-JP" sz="1000" dirty="0"/>
+              <a:t>Win32</a:t>
+            </a:r>
+          </a:p>
           <a:p>
             <a:pPr algn="ctr"/>
             <a:r>
-              <a:rPr lang="en-US" altLang="ja-JP" sz="1000" dirty="0">
-                <a:solidFill>
-                  <a:schemeClr val="bg1"/>
-                </a:solidFill>
-              </a:rPr>
-              <a:t>Win32API</a:t>
-            </a:r>
-            <a:endParaRPr kumimoji="1" lang="ja-JP" altLang="en-US" sz="1000" dirty="0">
-              <a:solidFill>
-                <a:schemeClr val="bg1"/>
-              </a:solidFill>
-            </a:endParaRPr>
-          </a:p>
-        </p:txBody>
-      </p:sp>
-      <p:sp>
-        <p:nvSpPr>
-          <p:cNvPr id="69" name="四角形: 角を丸くする 68">
-            <a:extLst>
-              <a:ext uri="{FF2B5EF4-FFF2-40B4-BE49-F238E27FC236}">
-                <a16:creationId xmlns:a16="http://schemas.microsoft.com/office/drawing/2014/main" id="{BE13F192-3D10-8C70-19B7-113312EA7E22}"/>
-              </a:ext>
-            </a:extLst>
-          </p:cNvPr>
-          <p:cNvSpPr/>
-          <p:nvPr/>
-        </p:nvSpPr>
-        <p:spPr>
-          <a:xfrm>
-            <a:off x="4914397" y="6073012"/>
-            <a:ext cx="3169243" cy="440774"/>
-          </a:xfrm>
-          <a:prstGeom prst="roundRect">
-            <a:avLst/>
-          </a:prstGeom>
-        </p:spPr>
-        <p:style>
-          <a:lnRef idx="2">
-            <a:schemeClr val="accent3">
-              <a:shade val="50000"/>
-            </a:schemeClr>
-          </a:lnRef>
-          <a:fillRef idx="1">
-            <a:schemeClr val="accent3"/>
-          </a:fillRef>
-          <a:effectRef idx="0">
-            <a:schemeClr val="accent3"/>
-          </a:effectRef>
-          <a:fontRef idx="minor">
-            <a:schemeClr val="lt1"/>
-          </a:fontRef>
-        </p:style>
-        <p:txBody>
-          <a:bodyPr rtlCol="0" anchor="ctr"/>
-          <a:lstStyle/>
+              <a:rPr lang="en-US" altLang="ja-JP" sz="1000" dirty="0"/>
+              <a:t>Message</a:t>
+            </a:r>
+          </a:p>
           <a:p>
             <a:pPr algn="ctr"/>
             <a:r>
-              <a:rPr lang="en-US" altLang="ja-JP" sz="1000" dirty="0">
-                <a:solidFill>
-                  <a:schemeClr val="bg1"/>
-                </a:solidFill>
-              </a:rPr>
-              <a:t>Media Foundation</a:t>
-            </a:r>
-            <a:endParaRPr kumimoji="1" lang="ja-JP" altLang="en-US" sz="1000" dirty="0">
-              <a:solidFill>
-                <a:schemeClr val="bg1"/>
-              </a:solidFill>
-            </a:endParaRPr>
-          </a:p>
-        </p:txBody>
-      </p:sp>
-      <p:sp>
-        <p:nvSpPr>
-          <p:cNvPr id="70" name="四角形: 角を丸くする 69">
-            <a:extLst>
-              <a:ext uri="{FF2B5EF4-FFF2-40B4-BE49-F238E27FC236}">
-                <a16:creationId xmlns:a16="http://schemas.microsoft.com/office/drawing/2014/main" id="{A2BBDD5D-9C38-8111-31BD-42A4D892E4DA}"/>
-              </a:ext>
-            </a:extLst>
-          </p:cNvPr>
-          <p:cNvSpPr/>
-          <p:nvPr/>
-        </p:nvSpPr>
-        <p:spPr>
-          <a:xfrm>
-            <a:off x="8265593" y="6069138"/>
-            <a:ext cx="3169243" cy="440774"/>
-          </a:xfrm>
-          <a:prstGeom prst="roundRect">
-            <a:avLst/>
-          </a:prstGeom>
-        </p:spPr>
-        <p:style>
-          <a:lnRef idx="2">
-            <a:schemeClr val="accent3">
-              <a:shade val="50000"/>
-            </a:schemeClr>
-          </a:lnRef>
-          <a:fillRef idx="1">
-            <a:schemeClr val="accent3"/>
-          </a:fillRef>
-          <a:effectRef idx="0">
-            <a:schemeClr val="accent3"/>
-          </a:effectRef>
-          <a:fontRef idx="minor">
-            <a:schemeClr val="lt1"/>
-          </a:fontRef>
-        </p:style>
-        <p:txBody>
-          <a:bodyPr rtlCol="0" anchor="ctr"/>
-          <a:lstStyle/>
-          <a:p>
-            <a:pPr algn="ctr"/>
-            <a:r>
-              <a:rPr lang="en-US" altLang="ja-JP" sz="1000" dirty="0">
-                <a:solidFill>
-                  <a:schemeClr val="bg1"/>
-                </a:solidFill>
-              </a:rPr>
-              <a:t>DirectX 11</a:t>
-            </a:r>
-            <a:endParaRPr kumimoji="1" lang="ja-JP" altLang="en-US" sz="1000" dirty="0">
-              <a:solidFill>
-                <a:schemeClr val="bg1"/>
-              </a:solidFill>
-            </a:endParaRPr>
+              <a:rPr kumimoji="1" lang="en-US" altLang="ja-JP" sz="1000" dirty="0"/>
+              <a:t>Handler</a:t>
+            </a:r>
+            <a:endParaRPr kumimoji="1" lang="ja-JP" altLang="en-US" sz="1000" dirty="0"/>
           </a:p>
         </p:txBody>
       </p:sp>
       <p:cxnSp>
         <p:nvCxnSpPr>
-          <p:cNvPr id="88" name="直線矢印コネクタ 87">
-            <a:extLst>
-              <a:ext uri="{FF2B5EF4-FFF2-40B4-BE49-F238E27FC236}">
-                <a16:creationId xmlns:a16="http://schemas.microsoft.com/office/drawing/2014/main" id="{916B5A5E-C36D-3233-0CCA-BE9476CAF528}"/>
+          <p:cNvPr id="10" name="直線矢印コネクタ 9">
+            <a:extLst>
+              <a:ext uri="{FF2B5EF4-FFF2-40B4-BE49-F238E27FC236}">
+                <a16:creationId xmlns:a16="http://schemas.microsoft.com/office/drawing/2014/main" id="{9F03DA76-398D-BB56-069E-DF6644558273}"/>
               </a:ext>
             </a:extLst>
           </p:cNvPr>
@@ -4497,8 +4724,8 @@
         </p:nvCxnSpPr>
         <p:spPr>
           <a:xfrm>
-            <a:off x="3687767" y="1688375"/>
-            <a:ext cx="1490134" cy="2261"/>
+            <a:off x="5463065" y="1951472"/>
+            <a:ext cx="940098" cy="0"/>
           </a:xfrm>
           <a:prstGeom prst="straightConnector1">
             <a:avLst/>
@@ -4527,10 +4754,10 @@
       </p:cxnSp>
       <p:cxnSp>
         <p:nvCxnSpPr>
-          <p:cNvPr id="89" name="直線矢印コネクタ 88">
-            <a:extLst>
-              <a:ext uri="{FF2B5EF4-FFF2-40B4-BE49-F238E27FC236}">
-                <a16:creationId xmlns:a16="http://schemas.microsoft.com/office/drawing/2014/main" id="{86AC9C2E-2388-FE3D-2F16-DCE74B7AB088}"/>
+          <p:cNvPr id="11" name="直線矢印コネクタ 10">
+            <a:extLst>
+              <a:ext uri="{FF2B5EF4-FFF2-40B4-BE49-F238E27FC236}">
+                <a16:creationId xmlns:a16="http://schemas.microsoft.com/office/drawing/2014/main" id="{7B36590A-8A30-C4D5-8D10-B200EED9F42A}"/>
               </a:ext>
             </a:extLst>
           </p:cNvPr>
@@ -4540,9 +4767,9 @@
           <p:nvPr/>
         </p:nvCxnSpPr>
         <p:spPr>
-          <a:xfrm flipH="1">
-            <a:off x="3687767" y="1981469"/>
-            <a:ext cx="1430867" cy="0"/>
+          <a:xfrm>
+            <a:off x="3715089" y="4023346"/>
+            <a:ext cx="587574" cy="0"/>
           </a:xfrm>
           <a:prstGeom prst="straightConnector1">
             <a:avLst/>
@@ -4569,12 +4796,76 @@
           </a:fontRef>
         </p:style>
       </p:cxnSp>
+      <p:sp>
+        <p:nvSpPr>
+          <p:cNvPr id="17" name="四角形: 角を丸くする 16">
+            <a:extLst>
+              <a:ext uri="{FF2B5EF4-FFF2-40B4-BE49-F238E27FC236}">
+                <a16:creationId xmlns:a16="http://schemas.microsoft.com/office/drawing/2014/main" id="{F4E75F5B-2446-25F3-543F-A0FB1990FDA7}"/>
+              </a:ext>
+            </a:extLst>
+          </p:cNvPr>
+          <p:cNvSpPr/>
+          <p:nvPr/>
+        </p:nvSpPr>
+        <p:spPr>
+          <a:xfrm>
+            <a:off x="9542022" y="2810045"/>
+            <a:ext cx="1669824" cy="711369"/>
+          </a:xfrm>
+          <a:prstGeom prst="roundRect">
+            <a:avLst/>
+          </a:prstGeom>
+          <a:noFill/>
+          <a:ln>
+            <a:solidFill>
+              <a:schemeClr val="tx1"/>
+            </a:solidFill>
+          </a:ln>
+        </p:spPr>
+        <p:style>
+          <a:lnRef idx="2">
+            <a:schemeClr val="accent6">
+              <a:shade val="50000"/>
+            </a:schemeClr>
+          </a:lnRef>
+          <a:fillRef idx="1">
+            <a:schemeClr val="accent6"/>
+          </a:fillRef>
+          <a:effectRef idx="0">
+            <a:schemeClr val="accent6"/>
+          </a:effectRef>
+          <a:fontRef idx="minor">
+            <a:schemeClr val="lt1"/>
+          </a:fontRef>
+        </p:style>
+        <p:txBody>
+          <a:bodyPr rtlCol="0" anchor="ctr"/>
+          <a:lstStyle/>
+          <a:p>
+            <a:pPr algn="ctr"/>
+            <a:r>
+              <a:rPr kumimoji="1" lang="en-US" altLang="ja-JP" sz="1000" dirty="0">
+                <a:solidFill>
+                  <a:schemeClr val="tx1"/>
+                </a:solidFill>
+              </a:rPr>
+              <a:t>SDL2</a:t>
+            </a:r>
+            <a:endParaRPr kumimoji="1" lang="ja-JP" altLang="en-US" sz="1000" dirty="0">
+              <a:solidFill>
+                <a:schemeClr val="tx1"/>
+              </a:solidFill>
+            </a:endParaRPr>
+          </a:p>
+        </p:txBody>
+      </p:sp>
       <p:cxnSp>
         <p:nvCxnSpPr>
-          <p:cNvPr id="90" name="直線矢印コネクタ 89">
-            <a:extLst>
-              <a:ext uri="{FF2B5EF4-FFF2-40B4-BE49-F238E27FC236}">
-                <a16:creationId xmlns:a16="http://schemas.microsoft.com/office/drawing/2014/main" id="{50061BA6-18B6-EF44-EF15-53A65493D9A1}"/>
+          <p:cNvPr id="19" name="直線矢印コネクタ 18">
+            <a:extLst>
+              <a:ext uri="{FF2B5EF4-FFF2-40B4-BE49-F238E27FC236}">
+                <a16:creationId xmlns:a16="http://schemas.microsoft.com/office/drawing/2014/main" id="{20B752B2-1FD2-B3C3-FA3A-48831895A5C8}"/>
               </a:ext>
             </a:extLst>
           </p:cNvPr>
@@ -4585,8 +4876,8 @@
         </p:nvCxnSpPr>
         <p:spPr>
           <a:xfrm>
-            <a:off x="3758033" y="2541592"/>
-            <a:ext cx="1490134" cy="2261"/>
+            <a:off x="5463065" y="3249853"/>
+            <a:ext cx="3946406" cy="0"/>
           </a:xfrm>
           <a:prstGeom prst="straightConnector1">
             <a:avLst/>
@@ -4613,12 +4904,81 @@
           </a:fontRef>
         </p:style>
       </p:cxnSp>
+      <p:sp>
+        <p:nvSpPr>
+          <p:cNvPr id="2" name="四角形: 角を丸くする 1">
+            <a:extLst>
+              <a:ext uri="{FF2B5EF4-FFF2-40B4-BE49-F238E27FC236}">
+                <a16:creationId xmlns:a16="http://schemas.microsoft.com/office/drawing/2014/main" id="{17C6CBD8-6A93-BDD0-0BDA-7ECB00C9C980}"/>
+              </a:ext>
+            </a:extLst>
+          </p:cNvPr>
+          <p:cNvSpPr/>
+          <p:nvPr/>
+        </p:nvSpPr>
+        <p:spPr>
+          <a:xfrm>
+            <a:off x="4430514" y="1592318"/>
+            <a:ext cx="900000" cy="720000"/>
+          </a:xfrm>
+          <a:prstGeom prst="roundRect">
+            <a:avLst/>
+          </a:prstGeom>
+        </p:spPr>
+        <p:style>
+          <a:lnRef idx="2">
+            <a:schemeClr val="accent6">
+              <a:shade val="50000"/>
+            </a:schemeClr>
+          </a:lnRef>
+          <a:fillRef idx="1">
+            <a:schemeClr val="accent6"/>
+          </a:fillRef>
+          <a:effectRef idx="0">
+            <a:schemeClr val="accent6"/>
+          </a:effectRef>
+          <a:fontRef idx="minor">
+            <a:schemeClr val="lt1"/>
+          </a:fontRef>
+        </p:style>
+        <p:txBody>
+          <a:bodyPr rtlCol="0" anchor="ctr"/>
+          <a:lstStyle/>
+          <a:p>
+            <a:pPr algn="ctr"/>
+            <a:r>
+              <a:rPr lang="en-US" altLang="ja-JP" sz="1000" dirty="0"/>
+              <a:t>Audio</a:t>
+            </a:r>
+          </a:p>
+          <a:p>
+            <a:pPr algn="ctr"/>
+            <a:r>
+              <a:rPr lang="en-US" altLang="ja-JP" sz="1000" dirty="0"/>
+              <a:t>Capture</a:t>
+            </a:r>
+            <a:endParaRPr kumimoji="1" lang="en-US" altLang="ja-JP" sz="1000" dirty="0"/>
+          </a:p>
+          <a:p>
+            <a:pPr algn="ctr"/>
+            <a:r>
+              <a:rPr lang="en-US" altLang="ja-JP" sz="1000" dirty="0"/>
+              <a:t>M</a:t>
+            </a:r>
+            <a:r>
+              <a:rPr kumimoji="1" lang="en-US" altLang="ja-JP" sz="1000" dirty="0"/>
+              <a:t>anager</a:t>
+            </a:r>
+            <a:endParaRPr kumimoji="1" lang="ja-JP" altLang="en-US" sz="1000" dirty="0"/>
+          </a:p>
+        </p:txBody>
+      </p:sp>
       <p:cxnSp>
         <p:nvCxnSpPr>
-          <p:cNvPr id="91" name="直線矢印コネクタ 90">
-            <a:extLst>
-              <a:ext uri="{FF2B5EF4-FFF2-40B4-BE49-F238E27FC236}">
-                <a16:creationId xmlns:a16="http://schemas.microsoft.com/office/drawing/2014/main" id="{0742164F-4AC1-84BF-0C6B-628F8C9EA034}"/>
+          <p:cNvPr id="13" name="直線矢印コネクタ 12">
+            <a:extLst>
+              <a:ext uri="{FF2B5EF4-FFF2-40B4-BE49-F238E27FC236}">
+                <a16:creationId xmlns:a16="http://schemas.microsoft.com/office/drawing/2014/main" id="{93FD254E-CC03-D267-707E-67AC6FF2B288}"/>
               </a:ext>
             </a:extLst>
           </p:cNvPr>
@@ -4628,9 +4988,9 @@
           <p:nvPr/>
         </p:nvCxnSpPr>
         <p:spPr>
-          <a:xfrm flipH="1">
-            <a:off x="3758033" y="2768580"/>
-            <a:ext cx="1430867" cy="0"/>
+          <a:xfrm>
+            <a:off x="3715089" y="3058411"/>
+            <a:ext cx="587574" cy="3832"/>
           </a:xfrm>
           <a:prstGeom prst="straightConnector1">
             <a:avLst/>
@@ -4657,190 +5017,12 @@
           </a:fontRef>
         </p:style>
       </p:cxnSp>
-      <p:cxnSp>
-        <p:nvCxnSpPr>
-          <p:cNvPr id="94" name="直線矢印コネクタ 93">
-            <a:extLst>
-              <a:ext uri="{FF2B5EF4-FFF2-40B4-BE49-F238E27FC236}">
-                <a16:creationId xmlns:a16="http://schemas.microsoft.com/office/drawing/2014/main" id="{C6446206-DC95-35E3-5F43-1DC80A251371}"/>
-              </a:ext>
-            </a:extLst>
-          </p:cNvPr>
-          <p:cNvCxnSpPr>
-            <a:cxnSpLocks/>
-          </p:cNvCxnSpPr>
-          <p:nvPr/>
-        </p:nvCxnSpPr>
-        <p:spPr>
-          <a:xfrm>
-            <a:off x="6277830" y="1844792"/>
-            <a:ext cx="1490134" cy="2261"/>
-          </a:xfrm>
-          <a:prstGeom prst="straightConnector1">
-            <a:avLst/>
-          </a:prstGeom>
-          <a:ln w="19050">
-            <a:solidFill>
-              <a:schemeClr val="tx1"/>
-            </a:solidFill>
-            <a:tailEnd type="triangle"/>
-          </a:ln>
-        </p:spPr>
-        <p:style>
-          <a:lnRef idx="1">
-            <a:schemeClr val="accent1"/>
-          </a:lnRef>
-          <a:fillRef idx="0">
-            <a:schemeClr val="accent1"/>
-          </a:fillRef>
-          <a:effectRef idx="0">
-            <a:schemeClr val="accent1"/>
-          </a:effectRef>
-          <a:fontRef idx="minor">
-            <a:schemeClr val="tx1"/>
-          </a:fontRef>
-        </p:style>
-      </p:cxnSp>
-      <p:cxnSp>
-        <p:nvCxnSpPr>
-          <p:cNvPr id="95" name="直線矢印コネクタ 94">
-            <a:extLst>
-              <a:ext uri="{FF2B5EF4-FFF2-40B4-BE49-F238E27FC236}">
-                <a16:creationId xmlns:a16="http://schemas.microsoft.com/office/drawing/2014/main" id="{EADC5655-B631-A370-E921-93EE88EB98FA}"/>
-              </a:ext>
-            </a:extLst>
-          </p:cNvPr>
-          <p:cNvCxnSpPr>
-            <a:cxnSpLocks/>
-          </p:cNvCxnSpPr>
-          <p:nvPr/>
-        </p:nvCxnSpPr>
-        <p:spPr>
-          <a:xfrm>
-            <a:off x="6289544" y="658578"/>
-            <a:ext cx="1490134" cy="2261"/>
-          </a:xfrm>
-          <a:prstGeom prst="straightConnector1">
-            <a:avLst/>
-          </a:prstGeom>
-          <a:ln w="19050">
-            <a:solidFill>
-              <a:schemeClr val="tx1"/>
-            </a:solidFill>
-            <a:tailEnd type="triangle"/>
-          </a:ln>
-        </p:spPr>
-        <p:style>
-          <a:lnRef idx="1">
-            <a:schemeClr val="accent1"/>
-          </a:lnRef>
-          <a:fillRef idx="0">
-            <a:schemeClr val="accent1"/>
-          </a:fillRef>
-          <a:effectRef idx="0">
-            <a:schemeClr val="accent1"/>
-          </a:effectRef>
-          <a:fontRef idx="minor">
-            <a:schemeClr val="tx1"/>
-          </a:fontRef>
-        </p:style>
-      </p:cxnSp>
-      <p:cxnSp>
-        <p:nvCxnSpPr>
-          <p:cNvPr id="97" name="直線矢印コネクタ 96">
-            <a:extLst>
-              <a:ext uri="{FF2B5EF4-FFF2-40B4-BE49-F238E27FC236}">
-                <a16:creationId xmlns:a16="http://schemas.microsoft.com/office/drawing/2014/main" id="{F0EDA7FA-1543-317F-2BAA-90D4DD169282}"/>
-              </a:ext>
-            </a:extLst>
-          </p:cNvPr>
-          <p:cNvCxnSpPr>
-            <a:cxnSpLocks/>
-          </p:cNvCxnSpPr>
-          <p:nvPr/>
-        </p:nvCxnSpPr>
-        <p:spPr>
-          <a:xfrm>
-            <a:off x="6285905" y="867914"/>
-            <a:ext cx="1490134" cy="2261"/>
-          </a:xfrm>
-          <a:prstGeom prst="straightConnector1">
-            <a:avLst/>
-          </a:prstGeom>
-          <a:ln w="19050">
-            <a:solidFill>
-              <a:schemeClr val="tx1"/>
-            </a:solidFill>
-            <a:tailEnd type="triangle"/>
-          </a:ln>
-        </p:spPr>
-        <p:style>
-          <a:lnRef idx="1">
-            <a:schemeClr val="accent1"/>
-          </a:lnRef>
-          <a:fillRef idx="0">
-            <a:schemeClr val="accent1"/>
-          </a:fillRef>
-          <a:effectRef idx="0">
-            <a:schemeClr val="accent1"/>
-          </a:effectRef>
-          <a:fontRef idx="minor">
-            <a:schemeClr val="tx1"/>
-          </a:fontRef>
-        </p:style>
-      </p:cxnSp>
-      <p:cxnSp>
-        <p:nvCxnSpPr>
-          <p:cNvPr id="99" name="直線矢印コネクタ 98">
-            <a:extLst>
-              <a:ext uri="{FF2B5EF4-FFF2-40B4-BE49-F238E27FC236}">
-                <a16:creationId xmlns:a16="http://schemas.microsoft.com/office/drawing/2014/main" id="{F4162064-7852-A811-8F07-8446B4D71ABD}"/>
-              </a:ext>
-            </a:extLst>
-          </p:cNvPr>
-          <p:cNvCxnSpPr>
-            <a:cxnSpLocks/>
-            <a:stCxn id="54" idx="0"/>
-            <a:endCxn id="101" idx="6"/>
-          </p:cNvCxnSpPr>
-          <p:nvPr/>
-        </p:nvCxnSpPr>
-        <p:spPr>
-          <a:xfrm rot="16200000" flipV="1">
-            <a:off x="7432455" y="-95994"/>
-            <a:ext cx="503582" cy="2996210"/>
-          </a:xfrm>
-          <a:prstGeom prst="bentConnector2">
-            <a:avLst/>
-          </a:prstGeom>
-          <a:ln w="19050">
-            <a:solidFill>
-              <a:schemeClr val="tx1"/>
-            </a:solidFill>
-            <a:tailEnd type="triangle"/>
-          </a:ln>
-        </p:spPr>
-        <p:style>
-          <a:lnRef idx="1">
-            <a:schemeClr val="accent1"/>
-          </a:lnRef>
-          <a:fillRef idx="0">
-            <a:schemeClr val="accent1"/>
-          </a:fillRef>
-          <a:effectRef idx="0">
-            <a:schemeClr val="accent1"/>
-          </a:effectRef>
-          <a:fontRef idx="minor">
-            <a:schemeClr val="tx1"/>
-          </a:fontRef>
-        </p:style>
-      </p:cxnSp>
-      <p:sp>
-        <p:nvSpPr>
-          <p:cNvPr id="101" name="楕円 100">
-            <a:extLst>
-              <a:ext uri="{FF2B5EF4-FFF2-40B4-BE49-F238E27FC236}">
-                <a16:creationId xmlns:a16="http://schemas.microsoft.com/office/drawing/2014/main" id="{7D67A727-002D-C333-3B2F-14131F045D21}"/>
+      <p:sp>
+        <p:nvSpPr>
+          <p:cNvPr id="39" name="楕円 38">
+            <a:extLst>
+              <a:ext uri="{FF2B5EF4-FFF2-40B4-BE49-F238E27FC236}">
+                <a16:creationId xmlns:a16="http://schemas.microsoft.com/office/drawing/2014/main" id="{6FA59785-EDCE-F352-C444-9403B1AE330C}"/>
               </a:ext>
             </a:extLst>
           </p:cNvPr>
@@ -4849,7 +5031,7 @@
         </p:nvSpPr>
         <p:spPr>
           <a:xfrm>
-            <a:off x="6004220" y="1075036"/>
+            <a:off x="6117172" y="5038969"/>
             <a:ext cx="181921" cy="150567"/>
           </a:xfrm>
           <a:prstGeom prst="ellipse">
@@ -4887,10 +5069,10 @@
       </p:sp>
       <p:sp>
         <p:nvSpPr>
-          <p:cNvPr id="3" name="四角形: 角を丸くする 2">
-            <a:extLst>
-              <a:ext uri="{FF2B5EF4-FFF2-40B4-BE49-F238E27FC236}">
-                <a16:creationId xmlns:a16="http://schemas.microsoft.com/office/drawing/2014/main" id="{4712B481-CC40-70FF-AB40-8FF97FBFB56D}"/>
+          <p:cNvPr id="20" name="四角形: 角を丸くする 19">
+            <a:extLst>
+              <a:ext uri="{FF2B5EF4-FFF2-40B4-BE49-F238E27FC236}">
+                <a16:creationId xmlns:a16="http://schemas.microsoft.com/office/drawing/2014/main" id="{50C12FAC-EC20-ADD8-78FF-5AF1CE1BCEF0}"/>
               </a:ext>
             </a:extLst>
           </p:cNvPr>
@@ -4899,12 +5081,18 @@
         </p:nvSpPr>
         <p:spPr>
           <a:xfrm>
-            <a:off x="7823894" y="2503866"/>
-            <a:ext cx="2668914" cy="393473"/>
+            <a:off x="9518072" y="668251"/>
+            <a:ext cx="1669825" cy="829207"/>
           </a:xfrm>
           <a:prstGeom prst="roundRect">
             <a:avLst/>
           </a:prstGeom>
+          <a:solidFill>
+            <a:schemeClr val="accent2">
+              <a:lumMod val="60000"/>
+              <a:lumOff val="40000"/>
+            </a:schemeClr>
+          </a:solidFill>
         </p:spPr>
         <p:style>
           <a:lnRef idx="2">
@@ -4928,12 +5116,12 @@
           <a:p>
             <a:pPr algn="ctr"/>
             <a:r>
-              <a:rPr lang="en-US" altLang="ja-JP" sz="1000" dirty="0" err="1">
+              <a:rPr kumimoji="1" lang="en-US" altLang="ja-JP" sz="1000" dirty="0">
                 <a:solidFill>
                   <a:schemeClr val="tx1"/>
                 </a:solidFill>
               </a:rPr>
-              <a:t>AudioCaptureCallback</a:t>
+              <a:t>DX11BaseRenderer</a:t>
             </a:r>
             <a:endParaRPr kumimoji="1" lang="ja-JP" altLang="en-US" sz="1000" dirty="0">
               <a:solidFill>
@@ -4945,197 +5133,10 @@
       </p:sp>
       <p:cxnSp>
         <p:nvCxnSpPr>
-          <p:cNvPr id="6" name="直線矢印コネクタ 5">
-            <a:extLst>
-              <a:ext uri="{FF2B5EF4-FFF2-40B4-BE49-F238E27FC236}">
-                <a16:creationId xmlns:a16="http://schemas.microsoft.com/office/drawing/2014/main" id="{361E017B-6C3D-77C0-46F3-4D9AB1B3B31B}"/>
-              </a:ext>
-            </a:extLst>
-          </p:cNvPr>
-          <p:cNvCxnSpPr>
-            <a:cxnSpLocks/>
-            <a:stCxn id="3" idx="2"/>
-            <a:endCxn id="24" idx="6"/>
-          </p:cNvCxnSpPr>
-          <p:nvPr/>
-        </p:nvCxnSpPr>
-        <p:spPr>
-          <a:xfrm rot="5400000">
-            <a:off x="7454090" y="1709768"/>
-            <a:ext cx="516691" cy="2891833"/>
-          </a:xfrm>
-          <a:prstGeom prst="bentConnector2">
-            <a:avLst/>
-          </a:prstGeom>
-          <a:ln w="19050">
-            <a:solidFill>
-              <a:schemeClr val="tx1"/>
-            </a:solidFill>
-            <a:tailEnd type="triangle"/>
-          </a:ln>
-        </p:spPr>
-        <p:style>
-          <a:lnRef idx="1">
-            <a:schemeClr val="accent1"/>
-          </a:lnRef>
-          <a:fillRef idx="0">
-            <a:schemeClr val="accent1"/>
-          </a:fillRef>
-          <a:effectRef idx="0">
-            <a:schemeClr val="accent1"/>
-          </a:effectRef>
-          <a:fontRef idx="minor">
-            <a:schemeClr val="tx1"/>
-          </a:fontRef>
-        </p:style>
-      </p:cxnSp>
-      <p:sp>
-        <p:nvSpPr>
-          <p:cNvPr id="7" name="四角形: 角を丸くする 6">
-            <a:extLst>
-              <a:ext uri="{FF2B5EF4-FFF2-40B4-BE49-F238E27FC236}">
-                <a16:creationId xmlns:a16="http://schemas.microsoft.com/office/drawing/2014/main" id="{5486FB98-B9BE-5AD7-975A-60048951719D}"/>
-              </a:ext>
-            </a:extLst>
-          </p:cNvPr>
-          <p:cNvSpPr/>
-          <p:nvPr/>
-        </p:nvSpPr>
-        <p:spPr>
-          <a:xfrm>
-            <a:off x="5286141" y="3180914"/>
-            <a:ext cx="900000" cy="1033200"/>
-          </a:xfrm>
-          <a:prstGeom prst="roundRect">
-            <a:avLst/>
-          </a:prstGeom>
-        </p:spPr>
-        <p:style>
-          <a:lnRef idx="2">
-            <a:schemeClr val="accent6">
-              <a:shade val="50000"/>
-            </a:schemeClr>
-          </a:lnRef>
-          <a:fillRef idx="1">
-            <a:schemeClr val="accent6"/>
-          </a:fillRef>
-          <a:effectRef idx="0">
-            <a:schemeClr val="accent6"/>
-          </a:effectRef>
-          <a:fontRef idx="minor">
-            <a:schemeClr val="lt1"/>
-          </a:fontRef>
-        </p:style>
-        <p:txBody>
-          <a:bodyPr rtlCol="0" anchor="ctr"/>
-          <a:lstStyle/>
-          <a:p>
-            <a:pPr algn="ctr"/>
-            <a:r>
-              <a:rPr kumimoji="1" lang="en-US" altLang="ja-JP" sz="1000" dirty="0"/>
-              <a:t>Audio</a:t>
-            </a:r>
-          </a:p>
-          <a:p>
-            <a:pPr algn="ctr"/>
-            <a:r>
-              <a:rPr lang="en-US" altLang="ja-JP" sz="1000" dirty="0"/>
-              <a:t>Output</a:t>
-            </a:r>
-            <a:endParaRPr kumimoji="1" lang="en-US" altLang="ja-JP" sz="1000" dirty="0"/>
-          </a:p>
-          <a:p>
-            <a:pPr algn="ctr"/>
-            <a:r>
-              <a:rPr lang="en-US" altLang="ja-JP" sz="1000" dirty="0"/>
-              <a:t>Device</a:t>
-            </a:r>
-            <a:endParaRPr kumimoji="1" lang="en-US" altLang="ja-JP" sz="1000" dirty="0"/>
-          </a:p>
-          <a:p>
-            <a:pPr algn="ctr"/>
-            <a:r>
-              <a:rPr lang="en-US" altLang="ja-JP" sz="1000" dirty="0"/>
-              <a:t>M</a:t>
-            </a:r>
-            <a:r>
-              <a:rPr kumimoji="1" lang="en-US" altLang="ja-JP" sz="1000" dirty="0"/>
-              <a:t>anager</a:t>
-            </a:r>
-            <a:endParaRPr kumimoji="1" lang="ja-JP" altLang="en-US" sz="1000" dirty="0"/>
-          </a:p>
-        </p:txBody>
-      </p:sp>
-      <p:sp>
-        <p:nvSpPr>
-          <p:cNvPr id="8" name="四角形: 角を丸くする 7">
-            <a:extLst>
-              <a:ext uri="{FF2B5EF4-FFF2-40B4-BE49-F238E27FC236}">
-                <a16:creationId xmlns:a16="http://schemas.microsoft.com/office/drawing/2014/main" id="{FB36455A-D2A1-D160-5ACD-07DFC0DADEF9}"/>
-              </a:ext>
-            </a:extLst>
-          </p:cNvPr>
-          <p:cNvSpPr/>
-          <p:nvPr/>
-        </p:nvSpPr>
-        <p:spPr>
-          <a:xfrm>
-            <a:off x="5299329" y="4361502"/>
-            <a:ext cx="900000" cy="1495169"/>
-          </a:xfrm>
-          <a:prstGeom prst="roundRect">
-            <a:avLst/>
-          </a:prstGeom>
-        </p:spPr>
-        <p:style>
-          <a:lnRef idx="2">
-            <a:schemeClr val="accent6">
-              <a:shade val="50000"/>
-            </a:schemeClr>
-          </a:lnRef>
-          <a:fillRef idx="1">
-            <a:schemeClr val="accent6"/>
-          </a:fillRef>
-          <a:effectRef idx="0">
-            <a:schemeClr val="accent6"/>
-          </a:effectRef>
-          <a:fontRef idx="minor">
-            <a:schemeClr val="lt1"/>
-          </a:fontRef>
-        </p:style>
-        <p:txBody>
-          <a:bodyPr rtlCol="0" anchor="ctr"/>
-          <a:lstStyle/>
-          <a:p>
-            <a:pPr algn="ctr"/>
-            <a:r>
-              <a:rPr kumimoji="1" lang="en-US" altLang="ja-JP" sz="1000" dirty="0"/>
-              <a:t>Win32</a:t>
-            </a:r>
-          </a:p>
-          <a:p>
-            <a:pPr algn="ctr"/>
-            <a:r>
-              <a:rPr lang="en-US" altLang="ja-JP" sz="1000" dirty="0"/>
-              <a:t>Message</a:t>
-            </a:r>
-          </a:p>
-          <a:p>
-            <a:pPr algn="ctr"/>
-            <a:r>
-              <a:rPr kumimoji="1" lang="en-US" altLang="ja-JP" sz="1000" dirty="0"/>
-              <a:t>Handler</a:t>
-            </a:r>
-            <a:endParaRPr kumimoji="1" lang="ja-JP" altLang="en-US" sz="1000" dirty="0"/>
-          </a:p>
-        </p:txBody>
-      </p:sp>
-      <p:cxnSp>
-        <p:nvCxnSpPr>
-          <p:cNvPr id="10" name="直線矢印コネクタ 9">
-            <a:extLst>
-              <a:ext uri="{FF2B5EF4-FFF2-40B4-BE49-F238E27FC236}">
-                <a16:creationId xmlns:a16="http://schemas.microsoft.com/office/drawing/2014/main" id="{9F03DA76-398D-BB56-069E-DF6644558273}"/>
+          <p:cNvPr id="46" name="直線矢印コネクタ 45">
+            <a:extLst>
+              <a:ext uri="{FF2B5EF4-FFF2-40B4-BE49-F238E27FC236}">
+                <a16:creationId xmlns:a16="http://schemas.microsoft.com/office/drawing/2014/main" id="{42BC0001-BEE1-569F-AFB1-2F7B7EB12F5E}"/>
               </a:ext>
             </a:extLst>
           </p:cNvPr>
@@ -5146,8 +5147,8 @@
         </p:nvCxnSpPr>
         <p:spPr>
           <a:xfrm>
-            <a:off x="6254659" y="2700603"/>
-            <a:ext cx="1490134" cy="2261"/>
+            <a:off x="8784139" y="1082447"/>
+            <a:ext cx="584036" cy="0"/>
           </a:xfrm>
           <a:prstGeom prst="straightConnector1">
             <a:avLst/>
@@ -5176,25 +5177,29 @@
       </p:cxnSp>
       <p:cxnSp>
         <p:nvCxnSpPr>
-          <p:cNvPr id="11" name="直線矢印コネクタ 10">
-            <a:extLst>
-              <a:ext uri="{FF2B5EF4-FFF2-40B4-BE49-F238E27FC236}">
-                <a16:creationId xmlns:a16="http://schemas.microsoft.com/office/drawing/2014/main" id="{7B36590A-8A30-C4D5-8D10-B200EED9F42A}"/>
+          <p:cNvPr id="56" name="直線矢印コネクタ 55">
+            <a:extLst>
+              <a:ext uri="{FF2B5EF4-FFF2-40B4-BE49-F238E27FC236}">
+                <a16:creationId xmlns:a16="http://schemas.microsoft.com/office/drawing/2014/main" id="{59129623-10D5-D4AE-DAEF-35A426BF55E6}"/>
               </a:ext>
             </a:extLst>
           </p:cNvPr>
           <p:cNvCxnSpPr>
             <a:cxnSpLocks/>
+            <a:stCxn id="96" idx="6"/>
+            <a:endCxn id="87" idx="6"/>
           </p:cNvCxnSpPr>
           <p:nvPr/>
         </p:nvCxnSpPr>
         <p:spPr>
-          <a:xfrm>
-            <a:off x="3709431" y="4603232"/>
-            <a:ext cx="1490134" cy="2261"/>
-          </a:xfrm>
-          <a:prstGeom prst="straightConnector1">
-            <a:avLst/>
+          <a:xfrm flipV="1">
+            <a:off x="11184087" y="1086427"/>
+            <a:ext cx="100289" cy="944144"/>
+          </a:xfrm>
+          <a:prstGeom prst="bentConnector3">
+            <a:avLst>
+              <a:gd name="adj1" fmla="val 327941"/>
+            </a:avLst>
           </a:prstGeom>
           <a:ln w="19050">
             <a:solidFill>
@@ -5220,437 +5225,28 @@
       </p:cxnSp>
       <p:cxnSp>
         <p:nvCxnSpPr>
-          <p:cNvPr id="12" name="直線矢印コネクタ 11">
-            <a:extLst>
-              <a:ext uri="{FF2B5EF4-FFF2-40B4-BE49-F238E27FC236}">
-                <a16:creationId xmlns:a16="http://schemas.microsoft.com/office/drawing/2014/main" id="{D8627423-5730-50A0-75A4-913808C25D00}"/>
+          <p:cNvPr id="60" name="直線矢印コネクタ 55">
+            <a:extLst>
+              <a:ext uri="{FF2B5EF4-FFF2-40B4-BE49-F238E27FC236}">
+                <a16:creationId xmlns:a16="http://schemas.microsoft.com/office/drawing/2014/main" id="{13E47255-96AE-57F8-425F-B28133B172D3}"/>
               </a:ext>
             </a:extLst>
           </p:cNvPr>
           <p:cNvCxnSpPr>
             <a:cxnSpLocks/>
+            <a:stCxn id="100" idx="6"/>
+            <a:endCxn id="87" idx="6"/>
           </p:cNvCxnSpPr>
           <p:nvPr/>
         </p:nvCxnSpPr>
         <p:spPr>
-          <a:xfrm flipH="1">
-            <a:off x="3709431" y="4830220"/>
-            <a:ext cx="1430867" cy="0"/>
-          </a:xfrm>
-          <a:prstGeom prst="straightConnector1">
-            <a:avLst/>
-          </a:prstGeom>
-          <a:ln w="19050">
-            <a:solidFill>
-              <a:schemeClr val="tx1"/>
-            </a:solidFill>
-            <a:tailEnd type="triangle"/>
-          </a:ln>
-        </p:spPr>
-        <p:style>
-          <a:lnRef idx="1">
-            <a:schemeClr val="accent1"/>
-          </a:lnRef>
-          <a:fillRef idx="0">
-            <a:schemeClr val="accent1"/>
-          </a:fillRef>
-          <a:effectRef idx="0">
-            <a:schemeClr val="accent1"/>
-          </a:effectRef>
-          <a:fontRef idx="minor">
-            <a:schemeClr val="tx1"/>
-          </a:fontRef>
-        </p:style>
-      </p:cxnSp>
-      <p:sp>
-        <p:nvSpPr>
-          <p:cNvPr id="17" name="四角形: 角を丸くする 16">
-            <a:extLst>
-              <a:ext uri="{FF2B5EF4-FFF2-40B4-BE49-F238E27FC236}">
-                <a16:creationId xmlns:a16="http://schemas.microsoft.com/office/drawing/2014/main" id="{F4E75F5B-2446-25F3-543F-A0FB1990FDA7}"/>
-              </a:ext>
-            </a:extLst>
-          </p:cNvPr>
-          <p:cNvSpPr/>
-          <p:nvPr/>
-        </p:nvSpPr>
-        <p:spPr>
-          <a:xfrm>
-            <a:off x="7847894" y="3756249"/>
-            <a:ext cx="1497024" cy="292894"/>
-          </a:xfrm>
-          <a:prstGeom prst="roundRect">
-            <a:avLst/>
-          </a:prstGeom>
-          <a:noFill/>
-          <a:ln>
-            <a:solidFill>
-              <a:schemeClr val="tx1"/>
-            </a:solidFill>
-          </a:ln>
-        </p:spPr>
-        <p:style>
-          <a:lnRef idx="2">
-            <a:schemeClr val="accent6">
-              <a:shade val="50000"/>
-            </a:schemeClr>
-          </a:lnRef>
-          <a:fillRef idx="1">
-            <a:schemeClr val="accent6"/>
-          </a:fillRef>
-          <a:effectRef idx="0">
-            <a:schemeClr val="accent6"/>
-          </a:effectRef>
-          <a:fontRef idx="minor">
-            <a:schemeClr val="lt1"/>
-          </a:fontRef>
-        </p:style>
-        <p:txBody>
-          <a:bodyPr rtlCol="0" anchor="ctr"/>
-          <a:lstStyle/>
-          <a:p>
-            <a:pPr algn="ctr"/>
-            <a:r>
-              <a:rPr kumimoji="1" lang="en-US" altLang="ja-JP" sz="1000" dirty="0">
-                <a:solidFill>
-                  <a:schemeClr val="tx1"/>
-                </a:solidFill>
-              </a:rPr>
-              <a:t>SDL2</a:t>
-            </a:r>
-            <a:endParaRPr kumimoji="1" lang="ja-JP" altLang="en-US" sz="1000" dirty="0">
-              <a:solidFill>
-                <a:schemeClr val="tx1"/>
-              </a:solidFill>
-            </a:endParaRPr>
-          </a:p>
-        </p:txBody>
-      </p:sp>
-      <p:cxnSp>
-        <p:nvCxnSpPr>
-          <p:cNvPr id="19" name="直線矢印コネクタ 18">
-            <a:extLst>
-              <a:ext uri="{FF2B5EF4-FFF2-40B4-BE49-F238E27FC236}">
-                <a16:creationId xmlns:a16="http://schemas.microsoft.com/office/drawing/2014/main" id="{20B752B2-1FD2-B3C3-FA3A-48831895A5C8}"/>
-              </a:ext>
-            </a:extLst>
-          </p:cNvPr>
-          <p:cNvCxnSpPr>
-            <a:cxnSpLocks/>
-          </p:cNvCxnSpPr>
-          <p:nvPr/>
-        </p:nvCxnSpPr>
-        <p:spPr>
-          <a:xfrm>
-            <a:off x="6266518" y="3903452"/>
-            <a:ext cx="1490134" cy="2261"/>
-          </a:xfrm>
-          <a:prstGeom prst="straightConnector1">
-            <a:avLst/>
-          </a:prstGeom>
-          <a:ln w="19050">
-            <a:solidFill>
-              <a:schemeClr val="tx1"/>
-            </a:solidFill>
-            <a:tailEnd type="triangle"/>
-          </a:ln>
-        </p:spPr>
-        <p:style>
-          <a:lnRef idx="1">
-            <a:schemeClr val="accent1"/>
-          </a:lnRef>
-          <a:fillRef idx="0">
-            <a:schemeClr val="accent1"/>
-          </a:fillRef>
-          <a:effectRef idx="0">
-            <a:schemeClr val="accent1"/>
-          </a:effectRef>
-          <a:fontRef idx="minor">
-            <a:schemeClr val="tx1"/>
-          </a:fontRef>
-        </p:style>
-      </p:cxnSp>
-      <p:sp>
-        <p:nvSpPr>
-          <p:cNvPr id="2" name="四角形: 角を丸くする 1">
-            <a:extLst>
-              <a:ext uri="{FF2B5EF4-FFF2-40B4-BE49-F238E27FC236}">
-                <a16:creationId xmlns:a16="http://schemas.microsoft.com/office/drawing/2014/main" id="{17C6CBD8-6A93-BDD0-0BDA-7ECB00C9C980}"/>
-              </a:ext>
-            </a:extLst>
-          </p:cNvPr>
-          <p:cNvSpPr/>
-          <p:nvPr/>
-        </p:nvSpPr>
-        <p:spPr>
-          <a:xfrm>
-            <a:off x="5275558" y="2313525"/>
-            <a:ext cx="900000" cy="720000"/>
-          </a:xfrm>
-          <a:prstGeom prst="roundRect">
-            <a:avLst/>
-          </a:prstGeom>
-        </p:spPr>
-        <p:style>
-          <a:lnRef idx="2">
-            <a:schemeClr val="accent6">
-              <a:shade val="50000"/>
-            </a:schemeClr>
-          </a:lnRef>
-          <a:fillRef idx="1">
-            <a:schemeClr val="accent6"/>
-          </a:fillRef>
-          <a:effectRef idx="0">
-            <a:schemeClr val="accent6"/>
-          </a:effectRef>
-          <a:fontRef idx="minor">
-            <a:schemeClr val="lt1"/>
-          </a:fontRef>
-        </p:style>
-        <p:txBody>
-          <a:bodyPr rtlCol="0" anchor="ctr"/>
-          <a:lstStyle/>
-          <a:p>
-            <a:pPr algn="ctr"/>
-            <a:r>
-              <a:rPr lang="en-US" altLang="ja-JP" sz="1000" dirty="0"/>
-              <a:t>Audio</a:t>
-            </a:r>
-          </a:p>
-          <a:p>
-            <a:pPr algn="ctr"/>
-            <a:r>
-              <a:rPr lang="en-US" altLang="ja-JP" sz="1000" dirty="0"/>
-              <a:t>Capture</a:t>
-            </a:r>
-            <a:endParaRPr kumimoji="1" lang="en-US" altLang="ja-JP" sz="1000" dirty="0"/>
-          </a:p>
-          <a:p>
-            <a:pPr algn="ctr"/>
-            <a:r>
-              <a:rPr lang="en-US" altLang="ja-JP" sz="1000" dirty="0"/>
-              <a:t>M</a:t>
-            </a:r>
-            <a:r>
-              <a:rPr kumimoji="1" lang="en-US" altLang="ja-JP" sz="1000" dirty="0"/>
-              <a:t>anager</a:t>
-            </a:r>
-            <a:endParaRPr kumimoji="1" lang="ja-JP" altLang="en-US" sz="1000" dirty="0"/>
-          </a:p>
-        </p:txBody>
-      </p:sp>
-      <p:cxnSp>
-        <p:nvCxnSpPr>
-          <p:cNvPr id="13" name="直線矢印コネクタ 12">
-            <a:extLst>
-              <a:ext uri="{FF2B5EF4-FFF2-40B4-BE49-F238E27FC236}">
-                <a16:creationId xmlns:a16="http://schemas.microsoft.com/office/drawing/2014/main" id="{93FD254E-CC03-D267-707E-67AC6FF2B288}"/>
-              </a:ext>
-            </a:extLst>
-          </p:cNvPr>
-          <p:cNvCxnSpPr>
-            <a:cxnSpLocks/>
-          </p:cNvCxnSpPr>
-          <p:nvPr/>
-        </p:nvCxnSpPr>
-        <p:spPr>
-          <a:xfrm>
-            <a:off x="3723803" y="3578458"/>
-            <a:ext cx="1490134" cy="2261"/>
-          </a:xfrm>
-          <a:prstGeom prst="straightConnector1">
-            <a:avLst/>
-          </a:prstGeom>
-          <a:ln w="19050">
-            <a:solidFill>
-              <a:schemeClr val="tx1"/>
-            </a:solidFill>
-            <a:tailEnd type="triangle"/>
-          </a:ln>
-        </p:spPr>
-        <p:style>
-          <a:lnRef idx="1">
-            <a:schemeClr val="accent1"/>
-          </a:lnRef>
-          <a:fillRef idx="0">
-            <a:schemeClr val="accent1"/>
-          </a:fillRef>
-          <a:effectRef idx="0">
-            <a:schemeClr val="accent1"/>
-          </a:effectRef>
-          <a:fontRef idx="minor">
-            <a:schemeClr val="tx1"/>
-          </a:fontRef>
-        </p:style>
-      </p:cxnSp>
-      <p:cxnSp>
-        <p:nvCxnSpPr>
-          <p:cNvPr id="15" name="直線矢印コネクタ 14">
-            <a:extLst>
-              <a:ext uri="{FF2B5EF4-FFF2-40B4-BE49-F238E27FC236}">
-                <a16:creationId xmlns:a16="http://schemas.microsoft.com/office/drawing/2014/main" id="{770B433B-78E5-3163-DE7A-CC790A4F690B}"/>
-              </a:ext>
-            </a:extLst>
-          </p:cNvPr>
-          <p:cNvCxnSpPr>
-            <a:cxnSpLocks/>
-          </p:cNvCxnSpPr>
-          <p:nvPr/>
-        </p:nvCxnSpPr>
-        <p:spPr>
-          <a:xfrm flipH="1">
-            <a:off x="3723803" y="3805446"/>
-            <a:ext cx="1430867" cy="0"/>
-          </a:xfrm>
-          <a:prstGeom prst="straightConnector1">
-            <a:avLst/>
-          </a:prstGeom>
-          <a:ln w="19050">
-            <a:solidFill>
-              <a:schemeClr val="tx1"/>
-            </a:solidFill>
-            <a:tailEnd type="triangle"/>
-          </a:ln>
-        </p:spPr>
-        <p:style>
-          <a:lnRef idx="1">
-            <a:schemeClr val="accent1"/>
-          </a:lnRef>
-          <a:fillRef idx="0">
-            <a:schemeClr val="accent1"/>
-          </a:fillRef>
-          <a:effectRef idx="0">
-            <a:schemeClr val="accent1"/>
-          </a:effectRef>
-          <a:fontRef idx="minor">
-            <a:schemeClr val="tx1"/>
-          </a:fontRef>
-        </p:style>
-      </p:cxnSp>
-      <p:sp>
-        <p:nvSpPr>
-          <p:cNvPr id="24" name="楕円 23">
-            <a:extLst>
-              <a:ext uri="{FF2B5EF4-FFF2-40B4-BE49-F238E27FC236}">
-                <a16:creationId xmlns:a16="http://schemas.microsoft.com/office/drawing/2014/main" id="{45FBC702-FA5A-3120-F123-7BEB9E4B3026}"/>
-              </a:ext>
-            </a:extLst>
-          </p:cNvPr>
-          <p:cNvSpPr/>
-          <p:nvPr/>
-        </p:nvSpPr>
-        <p:spPr>
-          <a:xfrm>
-            <a:off x="6084597" y="3338746"/>
-            <a:ext cx="181921" cy="150567"/>
-          </a:xfrm>
-          <a:prstGeom prst="ellipse">
-            <a:avLst/>
-          </a:prstGeom>
-          <a:noFill/>
-          <a:ln>
-            <a:noFill/>
-          </a:ln>
-        </p:spPr>
-        <p:style>
-          <a:lnRef idx="2">
-            <a:schemeClr val="accent1">
-              <a:shade val="50000"/>
-            </a:schemeClr>
-          </a:lnRef>
-          <a:fillRef idx="1">
-            <a:schemeClr val="accent1"/>
-          </a:fillRef>
-          <a:effectRef idx="0">
-            <a:schemeClr val="accent1"/>
-          </a:effectRef>
-          <a:fontRef idx="minor">
-            <a:schemeClr val="lt1"/>
-          </a:fontRef>
-        </p:style>
-        <p:txBody>
-          <a:bodyPr rtlCol="0" anchor="ctr"/>
-          <a:lstStyle/>
-          <a:p>
-            <a:pPr algn="ctr"/>
-            <a:endParaRPr kumimoji="1" lang="ja-JP" altLang="en-US"/>
-          </a:p>
-        </p:txBody>
-      </p:sp>
-      <p:sp>
-        <p:nvSpPr>
-          <p:cNvPr id="26" name="楕円 25">
-            <a:extLst>
-              <a:ext uri="{FF2B5EF4-FFF2-40B4-BE49-F238E27FC236}">
-                <a16:creationId xmlns:a16="http://schemas.microsoft.com/office/drawing/2014/main" id="{9C85C39E-768D-C49B-3E8D-1F47326452D9}"/>
-              </a:ext>
-            </a:extLst>
-          </p:cNvPr>
-          <p:cNvSpPr/>
-          <p:nvPr/>
-        </p:nvSpPr>
-        <p:spPr>
-          <a:xfrm>
-            <a:off x="6103984" y="3830430"/>
-            <a:ext cx="181921" cy="150567"/>
-          </a:xfrm>
-          <a:prstGeom prst="ellipse">
-            <a:avLst/>
-          </a:prstGeom>
-          <a:noFill/>
-          <a:ln>
-            <a:noFill/>
-          </a:ln>
-        </p:spPr>
-        <p:style>
-          <a:lnRef idx="2">
-            <a:schemeClr val="accent1">
-              <a:shade val="50000"/>
-            </a:schemeClr>
-          </a:lnRef>
-          <a:fillRef idx="1">
-            <a:schemeClr val="accent1"/>
-          </a:fillRef>
-          <a:effectRef idx="0">
-            <a:schemeClr val="accent1"/>
-          </a:effectRef>
-          <a:fontRef idx="minor">
-            <a:schemeClr val="lt1"/>
-          </a:fontRef>
-        </p:style>
-        <p:txBody>
-          <a:bodyPr rtlCol="0" anchor="ctr"/>
-          <a:lstStyle/>
-          <a:p>
-            <a:pPr algn="ctr"/>
-            <a:endParaRPr kumimoji="1" lang="ja-JP" altLang="en-US"/>
-          </a:p>
-        </p:txBody>
-      </p:sp>
-      <p:cxnSp>
-        <p:nvCxnSpPr>
-          <p:cNvPr id="30" name="直線矢印コネクタ 29">
-            <a:extLst>
-              <a:ext uri="{FF2B5EF4-FFF2-40B4-BE49-F238E27FC236}">
-                <a16:creationId xmlns:a16="http://schemas.microsoft.com/office/drawing/2014/main" id="{D87E023B-F925-54F7-E373-0C81C1FD9E71}"/>
-              </a:ext>
-            </a:extLst>
-          </p:cNvPr>
-          <p:cNvCxnSpPr>
-            <a:cxnSpLocks/>
-            <a:stCxn id="32" idx="6"/>
-            <a:endCxn id="39" idx="6"/>
-          </p:cNvCxnSpPr>
-          <p:nvPr/>
-        </p:nvCxnSpPr>
-        <p:spPr>
-          <a:xfrm>
-            <a:off x="6266517" y="368753"/>
-            <a:ext cx="32576" cy="4745500"/>
+          <a:xfrm flipV="1">
+            <a:off x="11192936" y="1086427"/>
+            <a:ext cx="91440" cy="1195300"/>
           </a:xfrm>
           <a:prstGeom prst="bentConnector3">
             <a:avLst>
-              <a:gd name="adj1" fmla="val 16058172"/>
+              <a:gd name="adj1" fmla="val 350000"/>
             </a:avLst>
           </a:prstGeom>
           <a:ln w="19050">
@@ -5677,10 +5273,10 @@
       </p:cxnSp>
       <p:sp>
         <p:nvSpPr>
-          <p:cNvPr id="32" name="楕円 31">
-            <a:extLst>
-              <a:ext uri="{FF2B5EF4-FFF2-40B4-BE49-F238E27FC236}">
-                <a16:creationId xmlns:a16="http://schemas.microsoft.com/office/drawing/2014/main" id="{9B0A6672-BC28-05C8-731C-497534C66634}"/>
+          <p:cNvPr id="81" name="楕円 80">
+            <a:extLst>
+              <a:ext uri="{FF2B5EF4-FFF2-40B4-BE49-F238E27FC236}">
+                <a16:creationId xmlns:a16="http://schemas.microsoft.com/office/drawing/2014/main" id="{79D91BE2-8C86-C430-C36E-CAAE1525AE54}"/>
               </a:ext>
             </a:extLst>
           </p:cNvPr>
@@ -5689,8 +5285,8 @@
         </p:nvSpPr>
         <p:spPr>
           <a:xfrm>
-            <a:off x="6084596" y="293469"/>
-            <a:ext cx="181921" cy="150567"/>
+            <a:off x="7574773" y="2157756"/>
+            <a:ext cx="165182" cy="169571"/>
           </a:xfrm>
           <a:prstGeom prst="ellipse">
             <a:avLst/>
@@ -5703,7 +5299,7 @@
         <p:style>
           <a:lnRef idx="2">
             <a:schemeClr val="accent1">
-              <a:shade val="50000"/>
+              <a:shade val="15000"/>
             </a:schemeClr>
           </a:lnRef>
           <a:fillRef idx="1">
@@ -5721,16 +5317,18 @@
           <a:lstStyle/>
           <a:p>
             <a:pPr algn="ctr"/>
-            <a:endParaRPr kumimoji="1" lang="ja-JP" altLang="en-US"/>
-          </a:p>
-        </p:txBody>
-      </p:sp>
-      <p:sp>
-        <p:nvSpPr>
-          <p:cNvPr id="39" name="楕円 38">
-            <a:extLst>
-              <a:ext uri="{FF2B5EF4-FFF2-40B4-BE49-F238E27FC236}">
-                <a16:creationId xmlns:a16="http://schemas.microsoft.com/office/drawing/2014/main" id="{6FA59785-EDCE-F352-C444-9403B1AE330C}"/>
+            <a:endParaRPr kumimoji="1" lang="ja-JP" altLang="en-US">
+              <a:noFill/>
+            </a:endParaRPr>
+          </a:p>
+        </p:txBody>
+      </p:sp>
+      <p:sp>
+        <p:nvSpPr>
+          <p:cNvPr id="87" name="楕円 86">
+            <a:extLst>
+              <a:ext uri="{FF2B5EF4-FFF2-40B4-BE49-F238E27FC236}">
+                <a16:creationId xmlns:a16="http://schemas.microsoft.com/office/drawing/2014/main" id="{99D6BB14-7498-EA80-5B37-038C51CBF58C}"/>
               </a:ext>
             </a:extLst>
           </p:cNvPr>
@@ -5739,8 +5337,8 @@
         </p:nvSpPr>
         <p:spPr>
           <a:xfrm>
-            <a:off x="6117172" y="5038969"/>
-            <a:ext cx="181921" cy="150567"/>
+            <a:off x="11119194" y="1001641"/>
+            <a:ext cx="165182" cy="169571"/>
           </a:xfrm>
           <a:prstGeom prst="ellipse">
             <a:avLst/>
@@ -5753,7 +5351,7 @@
         <p:style>
           <a:lnRef idx="2">
             <a:schemeClr val="accent1">
-              <a:shade val="50000"/>
+              <a:shade val="15000"/>
             </a:schemeClr>
           </a:lnRef>
           <a:fillRef idx="1">
@@ -5771,7 +5369,113 @@
           <a:lstStyle/>
           <a:p>
             <a:pPr algn="ctr"/>
-            <a:endParaRPr kumimoji="1" lang="ja-JP" altLang="en-US"/>
+            <a:endParaRPr kumimoji="1" lang="ja-JP" altLang="en-US">
+              <a:noFill/>
+            </a:endParaRPr>
+          </a:p>
+        </p:txBody>
+      </p:sp>
+      <p:sp>
+        <p:nvSpPr>
+          <p:cNvPr id="96" name="楕円 95">
+            <a:extLst>
+              <a:ext uri="{FF2B5EF4-FFF2-40B4-BE49-F238E27FC236}">
+                <a16:creationId xmlns:a16="http://schemas.microsoft.com/office/drawing/2014/main" id="{F2EFE5E2-B672-EE83-00B3-FA1D43D74B29}"/>
+              </a:ext>
+            </a:extLst>
+          </p:cNvPr>
+          <p:cNvSpPr/>
+          <p:nvPr/>
+        </p:nvSpPr>
+        <p:spPr>
+          <a:xfrm>
+            <a:off x="11018905" y="1945785"/>
+            <a:ext cx="165182" cy="169571"/>
+          </a:xfrm>
+          <a:prstGeom prst="ellipse">
+            <a:avLst/>
+          </a:prstGeom>
+          <a:noFill/>
+          <a:ln>
+            <a:noFill/>
+          </a:ln>
+        </p:spPr>
+        <p:style>
+          <a:lnRef idx="2">
+            <a:schemeClr val="accent1">
+              <a:shade val="15000"/>
+            </a:schemeClr>
+          </a:lnRef>
+          <a:fillRef idx="1">
+            <a:schemeClr val="accent1"/>
+          </a:fillRef>
+          <a:effectRef idx="0">
+            <a:schemeClr val="accent1"/>
+          </a:effectRef>
+          <a:fontRef idx="minor">
+            <a:schemeClr val="lt1"/>
+          </a:fontRef>
+        </p:style>
+        <p:txBody>
+          <a:bodyPr rtlCol="0" anchor="ctr"/>
+          <a:lstStyle/>
+          <a:p>
+            <a:pPr algn="ctr"/>
+            <a:endParaRPr kumimoji="1" lang="ja-JP" altLang="en-US">
+              <a:noFill/>
+            </a:endParaRPr>
+          </a:p>
+        </p:txBody>
+      </p:sp>
+      <p:sp>
+        <p:nvSpPr>
+          <p:cNvPr id="100" name="楕円 99">
+            <a:extLst>
+              <a:ext uri="{FF2B5EF4-FFF2-40B4-BE49-F238E27FC236}">
+                <a16:creationId xmlns:a16="http://schemas.microsoft.com/office/drawing/2014/main" id="{2BFE2883-AF75-E90C-4938-366F4A6FA823}"/>
+              </a:ext>
+            </a:extLst>
+          </p:cNvPr>
+          <p:cNvSpPr/>
+          <p:nvPr/>
+        </p:nvSpPr>
+        <p:spPr>
+          <a:xfrm>
+            <a:off x="11027754" y="2196941"/>
+            <a:ext cx="165182" cy="169571"/>
+          </a:xfrm>
+          <a:prstGeom prst="ellipse">
+            <a:avLst/>
+          </a:prstGeom>
+          <a:noFill/>
+          <a:ln>
+            <a:noFill/>
+          </a:ln>
+        </p:spPr>
+        <p:style>
+          <a:lnRef idx="2">
+            <a:schemeClr val="accent1">
+              <a:shade val="15000"/>
+            </a:schemeClr>
+          </a:lnRef>
+          <a:fillRef idx="1">
+            <a:schemeClr val="accent1"/>
+          </a:fillRef>
+          <a:effectRef idx="0">
+            <a:schemeClr val="accent1"/>
+          </a:effectRef>
+          <a:fontRef idx="minor">
+            <a:schemeClr val="lt1"/>
+          </a:fontRef>
+        </p:style>
+        <p:txBody>
+          <a:bodyPr rtlCol="0" anchor="ctr"/>
+          <a:lstStyle/>
+          <a:p>
+            <a:pPr algn="ctr"/>
+            <a:endParaRPr kumimoji="1" lang="ja-JP" altLang="en-US">
+              <a:noFill/>
+            </a:endParaRPr>
           </a:p>
         </p:txBody>
       </p:sp>

</xml_diff>